<commit_message>
Finished OS cheatsheet. ADA started.
</commit_message>
<xml_diff>
--- a/OS_Cheatsheet.pptx
+++ b/OS_Cheatsheet.pptx
@@ -7067,12 +7067,20 @@
               <a:t> stop all threads in the process – denies the core motivation of using threads. Non-blocking IO is harder to use and understand. </a:t>
             </a:r>
             <a:r>
-              <a:rPr lang="en-GB" sz="500" b="1" kern="100" spc="-43" dirty="0">
-                <a:latin typeface="Verdana" panose="020B0604030504040204" pitchFamily="34" charset="0"/>
-                <a:ea typeface="Verdana" panose="020B0604030504040204" pitchFamily="34" charset="0"/>
-                <a:cs typeface="Courier New" panose="02070309020205020404" pitchFamily="49" charset="0"/>
-              </a:rPr>
-              <a:t>During a page fault the OS blocks the entire process even though other threads might be runnable. </a:t>
+              <a:rPr lang="en-GB" sz="500" b="1" i="1" kern="100" spc="-43" dirty="0">
+                <a:latin typeface="Verdana" panose="020B0604030504040204" pitchFamily="34" charset="0"/>
+                <a:ea typeface="Verdana" panose="020B0604030504040204" pitchFamily="34" charset="0"/>
+                <a:cs typeface="Courier New" panose="02070309020205020404" pitchFamily="49" charset="0"/>
+              </a:rPr>
+              <a:t>During a page fault the OS blocks the entire process even though other threads might be runnable.</a:t>
+            </a:r>
+            <a:r>
+              <a:rPr lang="en-GB" sz="500" b="1" kern="100" spc="-43" dirty="0">
+                <a:latin typeface="Verdana" panose="020B0604030504040204" pitchFamily="34" charset="0"/>
+                <a:ea typeface="Verdana" panose="020B0604030504040204" pitchFamily="34" charset="0"/>
+                <a:cs typeface="Courier New" panose="02070309020205020404" pitchFamily="49" charset="0"/>
+              </a:rPr>
+              <a:t> </a:t>
             </a:r>
             <a:r>
               <a:rPr lang="en-GB" sz="500" kern="100" spc="-43" dirty="0">
@@ -13253,30 +13261,45 @@
                 <a:effectLst/>
                 <a:latin typeface="Source Code Pro" panose="020B0509030403020204" pitchFamily="49" charset="0"/>
               </a:rPr>
-              <a:t>[y]; }</a:t>
-            </a:r>
-          </a:p>
-          <a:p>
-            <a:r>
-              <a:rPr lang="en-GB" sz="500" dirty="0">
+              <a:t>[y]; } /*…*/</a:t>
+            </a:r>
+            <a:endParaRPr lang="en-GB" sz="500" dirty="0">
+              <a:solidFill>
+                <a:srgbClr val="000000"/>
+              </a:solidFill>
+              <a:latin typeface="Source Code Pro" panose="020B0509030403020204" pitchFamily="49" charset="0"/>
+            </a:endParaRPr>
+          </a:p>
+          <a:p>
+            <a:r>
+              <a:rPr lang="en-GB" sz="500" b="0" i="0" dirty="0">
+                <a:solidFill>
+                  <a:srgbClr val="9D00EC"/>
+                </a:solidFill>
+                <a:effectLst/>
+                <a:latin typeface="Source Code Pro" panose="020B0509030403020204" pitchFamily="49" charset="0"/>
+              </a:rPr>
+              <a:t>if</a:t>
+            </a:r>
+            <a:r>
+              <a:rPr lang="en-GB" sz="500" b="0" i="0" dirty="0">
                 <a:solidFill>
                   <a:srgbClr val="000000"/>
                 </a:solidFill>
+                <a:effectLst/>
                 <a:latin typeface="Source Code Pro" panose="020B0509030403020204" pitchFamily="49" charset="0"/>
               </a:rPr>
-              <a:t>/*..*/</a:t>
-            </a:r>
-          </a:p>
-          <a:p>
+              <a:t> (v == </a:t>
+            </a:r>
             <a:r>
               <a:rPr lang="en-GB" sz="500" b="0" i="0" dirty="0">
                 <a:solidFill>
-                  <a:srgbClr val="9D00EC"/>
+                  <a:srgbClr val="B21E00"/>
                 </a:solidFill>
                 <a:effectLst/>
                 <a:latin typeface="Source Code Pro" panose="020B0509030403020204" pitchFamily="49" charset="0"/>
               </a:rPr>
-              <a:t>if</a:t>
+              <a:t>0</a:t>
             </a:r>
             <a:r>
               <a:rPr lang="en-GB" sz="500" b="0" i="0" dirty="0">
@@ -13286,26 +13309,6 @@
                 <a:effectLst/>
                 <a:latin typeface="Source Code Pro" panose="020B0509030403020204" pitchFamily="49" charset="0"/>
               </a:rPr>
-              <a:t> (v == </a:t>
-            </a:r>
-            <a:r>
-              <a:rPr lang="en-GB" sz="500" b="0" i="0" dirty="0">
-                <a:solidFill>
-                  <a:srgbClr val="B21E00"/>
-                </a:solidFill>
-                <a:effectLst/>
-                <a:latin typeface="Source Code Pro" panose="020B0509030403020204" pitchFamily="49" charset="0"/>
-              </a:rPr>
-              <a:t>0</a:t>
-            </a:r>
-            <a:r>
-              <a:rPr lang="en-GB" sz="500" b="0" i="0" dirty="0">
-                <a:solidFill>
-                  <a:srgbClr val="000000"/>
-                </a:solidFill>
-                <a:effectLst/>
-                <a:latin typeface="Source Code Pro" panose="020B0509030403020204" pitchFamily="49" charset="0"/>
-              </a:rPr>
               <a:t>) {w = w_; x = x_; y = y_; z = z_;}</a:t>
             </a:r>
           </a:p>
@@ -14112,16 +14115,7 @@
                 <a:latin typeface="Verdana" panose="020B0604030504040204" pitchFamily="34" charset="0"/>
                 <a:ea typeface="Verdana" panose="020B0604030504040204" pitchFamily="34" charset="0"/>
               </a:rPr>
-              <a:t>  </a:t>
-            </a:r>
-          </a:p>
-          <a:p>
-            <a:r>
-              <a:rPr lang="en-GB" sz="500" kern="100" spc="-43" dirty="0">
-                <a:latin typeface="Verdana" panose="020B0604030504040204" pitchFamily="34" charset="0"/>
-                <a:ea typeface="Verdana" panose="020B0604030504040204" pitchFamily="34" charset="0"/>
-              </a:rPr>
-              <a:t>Objectives: 1) </a:t>
+              <a:t>   Objectives: 1) </a:t>
             </a:r>
             <a:r>
               <a:rPr lang="en-GB" sz="500" b="1" kern="100" spc="-43" dirty="0">
@@ -14172,24 +14166,41 @@
               </a:rPr>
               <a:t>Provide an API for IO operations. </a:t>
             </a:r>
-          </a:p>
-          <a:p>
-            <a:r>
-              <a:rPr lang="en-GB" sz="500" b="1" kern="100" spc="-43" dirty="0">
-                <a:latin typeface="Verdana" panose="020B0604030504040204" pitchFamily="34" charset="0"/>
-                <a:ea typeface="Verdana" panose="020B0604030504040204" pitchFamily="34" charset="0"/>
-              </a:rPr>
-              <a:t>Device Independence: </a:t>
-            </a:r>
-            <a:r>
-              <a:rPr lang="en-GB" sz="500" kern="100" spc="-43" dirty="0">
-                <a:latin typeface="Verdana" panose="020B0604030504040204" pitchFamily="34" charset="0"/>
-                <a:ea typeface="Verdana" panose="020B0604030504040204" pitchFamily="34" charset="0"/>
-              </a:rPr>
-              <a:t>means the OS should abstract away from specific device types (terminal/disk/drive) and the device instance – nowadays all devices can be addressed as though they’re indexable memory! </a:t>
-            </a:r>
-          </a:p>
-          <a:p>
+            <a:r>
+              <a:rPr lang="en-GB" sz="500" kern="100" spc="-43" dirty="0">
+                <a:latin typeface="Verdana" panose="020B0604030504040204" pitchFamily="34" charset="0"/>
+                <a:ea typeface="Verdana" panose="020B0604030504040204" pitchFamily="34" charset="0"/>
+              </a:rPr>
+              <a:t>4) </a:t>
+            </a:r>
+            <a:r>
+              <a:rPr lang="en-GB" sz="500" b="1" kern="100" spc="-43" dirty="0">
+                <a:latin typeface="Verdana" panose="020B0604030504040204" pitchFamily="34" charset="0"/>
+                <a:ea typeface="Verdana" panose="020B0604030504040204" pitchFamily="34" charset="0"/>
+              </a:rPr>
+              <a:t>Uniform naming and error handling</a:t>
+            </a:r>
+            <a:r>
+              <a:rPr lang="en-GB" sz="500" kern="100" spc="-43" dirty="0">
+                <a:latin typeface="Verdana" panose="020B0604030504040204" pitchFamily="34" charset="0"/>
+                <a:ea typeface="Verdana" panose="020B0604030504040204" pitchFamily="34" charset="0"/>
+              </a:rPr>
+              <a:t>. </a:t>
+            </a:r>
+            <a:r>
+              <a:rPr lang="en-GB" sz="500" b="1" kern="100" spc="-43" dirty="0">
+                <a:latin typeface="Verdana" panose="020B0604030504040204" pitchFamily="34" charset="0"/>
+                <a:ea typeface="Verdana" panose="020B0604030504040204" pitchFamily="34" charset="0"/>
+              </a:rPr>
+              <a:t> Device Independence: </a:t>
+            </a:r>
+            <a:r>
+              <a:rPr lang="en-GB" sz="500" kern="100" spc="-43" dirty="0">
+                <a:latin typeface="Verdana" panose="020B0604030504040204" pitchFamily="34" charset="0"/>
+                <a:ea typeface="Verdana" panose="020B0604030504040204" pitchFamily="34" charset="0"/>
+              </a:rPr>
+              <a:t>means the OS should abstract away from specific device types (terminal/disk/drive) and the device instance – nowadays all devices can be addressed as though they’re indexable memory!  </a:t>
+            </a:r>
             <a:r>
               <a:rPr lang="en-GB" sz="500" b="1" kern="100" spc="-43" dirty="0">
                 <a:latin typeface="Verdana" panose="020B0604030504040204" pitchFamily="34" charset="0"/>
@@ -14216,7 +14227,7 @@
                 <a:latin typeface="Verdana" panose="020B0604030504040204" pitchFamily="34" charset="0"/>
                 <a:ea typeface="Verdana" panose="020B0604030504040204" pitchFamily="34" charset="0"/>
               </a:rPr>
-              <a:t>Character – we write a stream of characters or Block - we access fixed size blocks of data at a time (Buffer cache improves performance for this). 2) </a:t>
+              <a:t>Character – we write a stream of characters or Block - we access fixed size blocks of data at a time (Buffer cache has data written to it in a stream until it becomes a block. Faster than char) performance for this). 2) </a:t>
             </a:r>
             <a:r>
               <a:rPr lang="en-GB" sz="500" b="1" kern="100" spc="-43" dirty="0">
@@ -14230,7 +14241,7 @@
                 <a:latin typeface="Verdana" panose="020B0604030504040204" pitchFamily="34" charset="0"/>
                 <a:ea typeface="Verdana" panose="020B0604030504040204" pitchFamily="34" charset="0"/>
               </a:rPr>
-              <a:t>(e.g. read, write, seek). 3) Synchronous or asynchronous operation. 4) Speed. 5) Shareability: Sharable (e.g. disks). Single user (e.g. printers, DVD-RW).  6) Type of error conditions.</a:t>
+              <a:t>(e.g. read, write, seek). 3) Synchronous or asynchronous operation. 4) Speed. 5) Shareability: Sharable (e.g. disks). Single user (e.g. printers, DVD-RW). 6) Type of error condition</a:t>
             </a:r>
             <a:endParaRPr lang="en-GB" sz="500" b="1" kern="100" spc="-43" dirty="0">
               <a:latin typeface="Verdana" panose="020B0604030504040204" pitchFamily="34" charset="0"/>
@@ -14759,7 +14770,7 @@
                 <a:latin typeface="Verdana" panose="020B0604030504040204" pitchFamily="34" charset="0"/>
                 <a:ea typeface="Verdana" panose="020B0604030504040204" pitchFamily="34" charset="0"/>
               </a:rPr>
-              <a:t>To implement drivers we need to interact with hardware. This is done with MMIO. This means particular device regs reside in mem </a:t>
+              <a:t>To implement drivers we need to interact with hardware. This is done with MMIO. This means particular device registers reside in mem </a:t>
             </a:r>
             <a:r>
               <a:rPr lang="en-GB" sz="500" kern="100" spc="-43" dirty="0" err="1">
@@ -16330,7 +16341,7 @@
         <p:spPr>
           <a:xfrm>
             <a:off x="4463419" y="-59267"/>
-            <a:ext cx="2275633" cy="7632859"/>
+            <a:ext cx="2300712" cy="7632859"/>
           </a:xfrm>
           <a:prstGeom prst="rect">
             <a:avLst/>
@@ -16385,6 +16396,8 @@
               </a:rPr>
               <a:t>. </a:t>
             </a:r>
+          </a:p>
+          <a:p>
             <a:r>
               <a:rPr lang="en-GB" sz="500" b="1" u="sng" kern="100" spc="-43" dirty="0">
                 <a:latin typeface="Verdana" panose="020B0604030504040204" pitchFamily="34" charset="0"/>
@@ -16966,8 +16979,8 @@
         </p:nvSpPr>
         <p:spPr>
           <a:xfrm>
-            <a:off x="6563582" y="-59267"/>
-            <a:ext cx="1930423" cy="7755969"/>
+            <a:off x="6574055" y="-59267"/>
+            <a:ext cx="1919950" cy="7755969"/>
           </a:xfrm>
           <a:prstGeom prst="rect">
             <a:avLst/>
@@ -17113,12 +17126,6 @@
               </a:rPr>
               <a:t> </a:t>
             </a:r>
-            <a:endParaRPr lang="en-GB" sz="500" kern="100" spc="-43" dirty="0">
-              <a:latin typeface="Verdana" panose="020B0604030504040204" pitchFamily="34" charset="0"/>
-              <a:ea typeface="Verdana" panose="020B0604030504040204" pitchFamily="34" charset="0"/>
-            </a:endParaRPr>
-          </a:p>
-          <a:p>
             <a:r>
               <a:rPr lang="en-GB" sz="500" b="1" u="sng" kern="100" spc="-43" dirty="0">
                 <a:latin typeface="Verdana" panose="020B0604030504040204" pitchFamily="34" charset="0"/>
@@ -17404,7 +17411,35 @@
                 <a:latin typeface="Verdana" panose="020B0604030504040204" pitchFamily="34" charset="0"/>
                 <a:ea typeface="Verdana" panose="020B0604030504040204" pitchFamily="34" charset="0"/>
               </a:rPr>
-              <a:t> entry in memory. It contains disk device </a:t>
+              <a:t> entry in memory. The struct contains: </a:t>
+            </a:r>
+            <a:r>
+              <a:rPr lang="en-GB" sz="500" b="1" kern="100" spc="-43" dirty="0">
+                <a:latin typeface="Verdana" panose="020B0604030504040204" pitchFamily="34" charset="0"/>
+                <a:ea typeface="Verdana" panose="020B0604030504040204" pitchFamily="34" charset="0"/>
+              </a:rPr>
+              <a:t>Type and access control, number of links, User ID, Group ID, access/modification/</a:t>
+            </a:r>
+            <a:r>
+              <a:rPr lang="en-GB" sz="500" b="1" kern="100" spc="-43" dirty="0" err="1">
+                <a:latin typeface="Verdana" panose="020B0604030504040204" pitchFamily="34" charset="0"/>
+                <a:ea typeface="Verdana" panose="020B0604030504040204" pitchFamily="34" charset="0"/>
+              </a:rPr>
+              <a:t>inode</a:t>
+            </a:r>
+            <a:r>
+              <a:rPr lang="en-GB" sz="500" b="1" kern="100" spc="-43" dirty="0">
+                <a:latin typeface="Verdana" panose="020B0604030504040204" pitchFamily="34" charset="0"/>
+                <a:ea typeface="Verdana" panose="020B0604030504040204" pitchFamily="34" charset="0"/>
+              </a:rPr>
+              <a:t> change time. </a:t>
+            </a:r>
+            <a:r>
+              <a:rPr lang="en-GB" sz="500" kern="100" spc="-43" dirty="0">
+                <a:latin typeface="Verdana" panose="020B0604030504040204" pitchFamily="34" charset="0"/>
+                <a:ea typeface="Verdana" panose="020B0604030504040204" pitchFamily="34" charset="0"/>
+              </a:rPr>
+              <a:t>It contains disk device </a:t>
             </a:r>
             <a:r>
               <a:rPr lang="en-GB" sz="500" kern="100" spc="-43" dirty="0" err="1">
@@ -17502,7 +17537,7 @@
                 <a:latin typeface="Verdana" panose="020B0604030504040204" pitchFamily="34" charset="0"/>
                 <a:ea typeface="Verdana" panose="020B0604030504040204" pitchFamily="34" charset="0"/>
               </a:rPr>
-              <a:t> containing: 6 direct pointers, 1 indirect and 1 doubly indirect. Pointer = 8B, block = 1024B, each indirect block fills a whole block on the disk. We can compute max file size: An indirect block holds 1024/8 = 128 pointers to other blocks. The maximum number of blocks = 6 + 128  + 128 × 128 = 16,518 blocks = 16,914,432 bytes. </a:t>
+              <a:t> containing: 6 direct pointers, 1 indirect and 1 doubly indirect. Pointer = 8B, block = 1024B, each indirect block fills a whole block on the disk. We can compute max file size: An indirect block holds 1024/8 = 128 pointers to other blocks. The maximum number of blocks = 6 x 128  + 128 × 128 = 16,518 blocks = 16,914,432 bytes. </a:t>
             </a:r>
             <a:r>
               <a:rPr lang="en-GB" sz="500" b="1" kern="100" spc="-43" dirty="0">
@@ -17544,10 +17579,8 @@
                 <a:latin typeface="Verdana" panose="020B0604030504040204" pitchFamily="34" charset="0"/>
                 <a:ea typeface="Verdana" panose="020B0604030504040204" pitchFamily="34" charset="0"/>
               </a:rPr>
-              <a:t>, then 2 reads to get the data block, then 1 more to read from the data block. Requires 4 reads. </a:t>
-            </a:r>
-          </a:p>
-          <a:p>
+              <a:t>, then 2 reads to get the data block, then 1 more to read from the data block. Requires 4 reads.  </a:t>
+            </a:r>
             <a:r>
               <a:rPr lang="en-GB" sz="500" b="1" u="sng" kern="100" spc="-43" dirty="0">
                 <a:latin typeface="Verdana" panose="020B0604030504040204" pitchFamily="34" charset="0"/>
@@ -17618,8 +17651,6 @@
               </a:rPr>
               <a:t>Bitmap: Each bit represents a block at an index. Uses low memory, quickly determine contiguous blocks (for placing file’s – min seek time), bit operations are very fast (O(1)). May need to search entire map to find free entry (slow).</a:t>
             </a:r>
-          </a:p>
-          <a:p>
             <a:r>
               <a:rPr lang="en-GB" sz="500" b="1" u="sng" kern="100" spc="-43" dirty="0">
                 <a:latin typeface="Verdana" panose="020B0604030504040204" pitchFamily="34" charset="0"/>
@@ -17683,13 +17714,27 @@
                 <a:latin typeface="Verdana" panose="020B0604030504040204" pitchFamily="34" charset="0"/>
                 <a:ea typeface="Verdana" panose="020B0604030504040204" pitchFamily="34" charset="0"/>
               </a:rPr>
-              <a:t> Block Bitmap| Data and </a:t>
+              <a:t> Block </a:t>
             </a:r>
             <a:r>
               <a:rPr lang="en-GB" sz="400" kern="100" spc="-43" dirty="0" err="1">
                 <a:latin typeface="Verdana" panose="020B0604030504040204" pitchFamily="34" charset="0"/>
                 <a:ea typeface="Verdana" panose="020B0604030504040204" pitchFamily="34" charset="0"/>
               </a:rPr>
+              <a:t>Bitmap|Data</a:t>
+            </a:r>
+            <a:r>
+              <a:rPr lang="en-GB" sz="400" kern="100" spc="-43" dirty="0">
+                <a:latin typeface="Verdana" panose="020B0604030504040204" pitchFamily="34" charset="0"/>
+                <a:ea typeface="Verdana" panose="020B0604030504040204" pitchFamily="34" charset="0"/>
+              </a:rPr>
+              <a:t> &amp; </a:t>
+            </a:r>
+            <a:r>
+              <a:rPr lang="en-GB" sz="400" kern="100" spc="-43" dirty="0" err="1">
+                <a:latin typeface="Verdana" panose="020B0604030504040204" pitchFamily="34" charset="0"/>
+                <a:ea typeface="Verdana" panose="020B0604030504040204" pitchFamily="34" charset="0"/>
+              </a:rPr>
               <a:t>Inode</a:t>
             </a:r>
             <a:r>
@@ -17697,7 +17742,7 @@
                 <a:latin typeface="Verdana" panose="020B0604030504040204" pitchFamily="34" charset="0"/>
                 <a:ea typeface="Verdana" panose="020B0604030504040204" pitchFamily="34" charset="0"/>
               </a:rPr>
-              <a:t> Blocks: | … | |</a:t>
+              <a:t> Blocks:|…||. </a:t>
             </a:r>
           </a:p>
           <a:p>
@@ -18982,7 +19027,7 @@
           </a:p>
           <a:p>
             <a:r>
-              <a:rPr lang="en-GB" sz="500" b="1" kern="100" spc="-43" dirty="0">
+              <a:rPr lang="en-GB" sz="500" b="1" u="sng" kern="100" spc="-43" dirty="0">
                 <a:latin typeface="Verdana" panose="020B0604030504040204" pitchFamily="34" charset="0"/>
                 <a:ea typeface="Verdana" panose="020B0604030504040204" pitchFamily="34" charset="0"/>
               </a:rPr>

</xml_diff>

<commit_message>
Finished extra 3 cheatsheets.
</commit_message>
<xml_diff>
--- a/OS_Cheatsheet.pptx
+++ b/OS_Cheatsheet.pptx
@@ -254,7 +254,7 @@
           <a:p>
             <a:fld id="{3660F9A5-6C07-4BB8-A079-DA68321F71B2}" type="datetimeFigureOut">
               <a:rPr lang="en-GB" smtClean="0"/>
-              <a:t>05/04/2023</a:t>
+              <a:t>14/04/2023</a:t>
             </a:fld>
             <a:endParaRPr lang="en-GB"/>
           </a:p>
@@ -424,7 +424,7 @@
           <a:p>
             <a:fld id="{3660F9A5-6C07-4BB8-A079-DA68321F71B2}" type="datetimeFigureOut">
               <a:rPr lang="en-GB" smtClean="0"/>
-              <a:t>05/04/2023</a:t>
+              <a:t>14/04/2023</a:t>
             </a:fld>
             <a:endParaRPr lang="en-GB"/>
           </a:p>
@@ -604,7 +604,7 @@
           <a:p>
             <a:fld id="{3660F9A5-6C07-4BB8-A079-DA68321F71B2}" type="datetimeFigureOut">
               <a:rPr lang="en-GB" smtClean="0"/>
-              <a:t>05/04/2023</a:t>
+              <a:t>14/04/2023</a:t>
             </a:fld>
             <a:endParaRPr lang="en-GB"/>
           </a:p>
@@ -774,7 +774,7 @@
           <a:p>
             <a:fld id="{3660F9A5-6C07-4BB8-A079-DA68321F71B2}" type="datetimeFigureOut">
               <a:rPr lang="en-GB" smtClean="0"/>
-              <a:t>05/04/2023</a:t>
+              <a:t>14/04/2023</a:t>
             </a:fld>
             <a:endParaRPr lang="en-GB"/>
           </a:p>
@@ -1018,7 +1018,7 @@
           <a:p>
             <a:fld id="{3660F9A5-6C07-4BB8-A079-DA68321F71B2}" type="datetimeFigureOut">
               <a:rPr lang="en-GB" smtClean="0"/>
-              <a:t>05/04/2023</a:t>
+              <a:t>14/04/2023</a:t>
             </a:fld>
             <a:endParaRPr lang="en-GB"/>
           </a:p>
@@ -1250,7 +1250,7 @@
           <a:p>
             <a:fld id="{3660F9A5-6C07-4BB8-A079-DA68321F71B2}" type="datetimeFigureOut">
               <a:rPr lang="en-GB" smtClean="0"/>
-              <a:t>05/04/2023</a:t>
+              <a:t>14/04/2023</a:t>
             </a:fld>
             <a:endParaRPr lang="en-GB"/>
           </a:p>
@@ -1617,7 +1617,7 @@
           <a:p>
             <a:fld id="{3660F9A5-6C07-4BB8-A079-DA68321F71B2}" type="datetimeFigureOut">
               <a:rPr lang="en-GB" smtClean="0"/>
-              <a:t>05/04/2023</a:t>
+              <a:t>14/04/2023</a:t>
             </a:fld>
             <a:endParaRPr lang="en-GB"/>
           </a:p>
@@ -1735,7 +1735,7 @@
           <a:p>
             <a:fld id="{3660F9A5-6C07-4BB8-A079-DA68321F71B2}" type="datetimeFigureOut">
               <a:rPr lang="en-GB" smtClean="0"/>
-              <a:t>05/04/2023</a:t>
+              <a:t>14/04/2023</a:t>
             </a:fld>
             <a:endParaRPr lang="en-GB"/>
           </a:p>
@@ -1830,7 +1830,7 @@
           <a:p>
             <a:fld id="{3660F9A5-6C07-4BB8-A079-DA68321F71B2}" type="datetimeFigureOut">
               <a:rPr lang="en-GB" smtClean="0"/>
-              <a:t>05/04/2023</a:t>
+              <a:t>14/04/2023</a:t>
             </a:fld>
             <a:endParaRPr lang="en-GB"/>
           </a:p>
@@ -2107,7 +2107,7 @@
           <a:p>
             <a:fld id="{3660F9A5-6C07-4BB8-A079-DA68321F71B2}" type="datetimeFigureOut">
               <a:rPr lang="en-GB" smtClean="0"/>
-              <a:t>05/04/2023</a:t>
+              <a:t>14/04/2023</a:t>
             </a:fld>
             <a:endParaRPr lang="en-GB"/>
           </a:p>
@@ -2364,7 +2364,7 @@
           <a:p>
             <a:fld id="{3660F9A5-6C07-4BB8-A079-DA68321F71B2}" type="datetimeFigureOut">
               <a:rPr lang="en-GB" smtClean="0"/>
-              <a:t>05/04/2023</a:t>
+              <a:t>14/04/2023</a:t>
             </a:fld>
             <a:endParaRPr lang="en-GB"/>
           </a:p>
@@ -2577,7 +2577,7 @@
           <a:p>
             <a:fld id="{3660F9A5-6C07-4BB8-A079-DA68321F71B2}" type="datetimeFigureOut">
               <a:rPr lang="en-GB" smtClean="0"/>
-              <a:t>05/04/2023</a:t>
+              <a:t>14/04/2023</a:t>
             </a:fld>
             <a:endParaRPr lang="en-GB"/>
           </a:p>
@@ -15286,7 +15286,886 @@
                 <a:latin typeface="Verdana" panose="020B0604030504040204" pitchFamily="34" charset="0"/>
                 <a:ea typeface="Verdana" panose="020B0604030504040204" pitchFamily="34" charset="0"/>
               </a:rPr>
-              <a:t>Sockets are an I/O abstraction that allow for bidirectional communication between processes on a single machine or devices over a network. They are a separate I/O class due to the unique nature of network communication, which can involve variable amounts of data (packets) and potential packet loss. There are two types of sockets: TCP (stream sockets) and UDP (datagram sockets), each with their own protocols to handle communication.</a:t>
+              <a:t>Sockets are an I/O abstraction that allow for bidirectional communication between processes on a single machine or devices over a network. They are a separate I/O class due to the unique nature of network communication, which can involve variable amounts of data (packets) and potential packet loss. There are two types of sockets: TCP (stream sockets) and UDP (datagram sockets), each with their own protocols to handle communication. </a:t>
+            </a:r>
+            <a:r>
+              <a:rPr lang="en-GB" sz="500" b="1" i="0" u="none" strike="noStrike" dirty="0">
+                <a:solidFill>
+                  <a:srgbClr val="9900FF"/>
+                </a:solidFill>
+                <a:effectLst/>
+                <a:latin typeface="Courier New" panose="02070309020205020404" pitchFamily="49" charset="0"/>
+              </a:rPr>
+              <a:t>int </a:t>
+            </a:r>
+            <a:r>
+              <a:rPr lang="en-GB" sz="500" b="1" i="0" u="none" strike="noStrike" dirty="0">
+                <a:solidFill>
+                  <a:srgbClr val="0000FF"/>
+                </a:solidFill>
+                <a:effectLst/>
+                <a:latin typeface="Courier New" panose="02070309020205020404" pitchFamily="49" charset="0"/>
+              </a:rPr>
+              <a:t>create</a:t>
+            </a:r>
+            <a:r>
+              <a:rPr lang="en-GB" sz="500" b="1" i="0" u="none" strike="noStrike" dirty="0">
+                <a:solidFill>
+                  <a:srgbClr val="B45F06"/>
+                </a:solidFill>
+                <a:effectLst/>
+                <a:latin typeface="Courier New" panose="02070309020205020404" pitchFamily="49" charset="0"/>
+              </a:rPr>
+              <a:t>(</a:t>
+            </a:r>
+            <a:r>
+              <a:rPr lang="en-GB" sz="500" b="1" i="0" u="none" strike="noStrike" dirty="0" err="1">
+                <a:solidFill>
+                  <a:srgbClr val="9900FF"/>
+                </a:solidFill>
+                <a:effectLst/>
+                <a:latin typeface="Courier New" panose="02070309020205020404" pitchFamily="49" charset="0"/>
+              </a:rPr>
+              <a:t>const</a:t>
+            </a:r>
+            <a:r>
+              <a:rPr lang="en-GB" sz="500" b="1" i="0" u="none" strike="noStrike" dirty="0">
+                <a:solidFill>
+                  <a:srgbClr val="9900FF"/>
+                </a:solidFill>
+                <a:effectLst/>
+                <a:latin typeface="Courier New" panose="02070309020205020404" pitchFamily="49" charset="0"/>
+              </a:rPr>
+              <a:t> char</a:t>
+            </a:r>
+            <a:r>
+              <a:rPr lang="en-GB" sz="500" b="1" i="0" u="none" strike="noStrike" dirty="0">
+                <a:solidFill>
+                  <a:srgbClr val="B45F06"/>
+                </a:solidFill>
+                <a:effectLst/>
+                <a:latin typeface="Courier New" panose="02070309020205020404" pitchFamily="49" charset="0"/>
+              </a:rPr>
+              <a:t>* path, </a:t>
+            </a:r>
+            <a:r>
+              <a:rPr lang="en-GB" sz="500" b="1" i="0" u="none" strike="noStrike" dirty="0">
+                <a:solidFill>
+                  <a:srgbClr val="9900FF"/>
+                </a:solidFill>
+                <a:effectLst/>
+                <a:latin typeface="Courier New" panose="02070309020205020404" pitchFamily="49" charset="0"/>
+              </a:rPr>
+              <a:t>int </a:t>
+            </a:r>
+            <a:r>
+              <a:rPr lang="en-GB" sz="500" b="1" i="0" u="none" strike="noStrike" dirty="0">
+                <a:solidFill>
+                  <a:srgbClr val="B45F06"/>
+                </a:solidFill>
+                <a:effectLst/>
+                <a:latin typeface="Courier New" panose="02070309020205020404" pitchFamily="49" charset="0"/>
+              </a:rPr>
+              <a:t>perm)</a:t>
+            </a:r>
+            <a:r>
+              <a:rPr lang="en-GB" sz="500" kern="100" spc="-43" dirty="0">
+                <a:latin typeface="Verdana" panose="020B0604030504040204" pitchFamily="34" charset="0"/>
+                <a:ea typeface="Verdana" panose="020B0604030504040204" pitchFamily="34" charset="0"/>
+              </a:rPr>
+              <a:t>Returns an </a:t>
+            </a:r>
+            <a:r>
+              <a:rPr lang="en-GB" sz="500" kern="100" spc="-43" dirty="0" err="1">
+                <a:latin typeface="Verdana" panose="020B0604030504040204" pitchFamily="34" charset="0"/>
+                <a:ea typeface="Verdana" panose="020B0604030504040204" pitchFamily="34" charset="0"/>
+              </a:rPr>
+              <a:t>fd</a:t>
+            </a:r>
+            <a:r>
+              <a:rPr lang="en-GB" sz="500" kern="100" spc="-43" dirty="0">
+                <a:latin typeface="Verdana" panose="020B0604030504040204" pitchFamily="34" charset="0"/>
+                <a:ea typeface="Verdana" panose="020B0604030504040204" pitchFamily="34" charset="0"/>
+              </a:rPr>
+              <a:t>, takes a file path and opens it for reading and writing (makes file object). perm for access control. </a:t>
+            </a:r>
+            <a:r>
+              <a:rPr lang="en-GB" sz="500" b="1" dirty="0">
+                <a:solidFill>
+                  <a:srgbClr val="9900FF"/>
+                </a:solidFill>
+                <a:latin typeface="Courier New" panose="02070309020205020404" pitchFamily="49" charset="0"/>
+              </a:rPr>
+              <a:t>i</a:t>
+            </a:r>
+            <a:r>
+              <a:rPr lang="en-GB" sz="500" b="1" i="0" u="none" strike="noStrike" dirty="0">
+                <a:solidFill>
+                  <a:srgbClr val="9900FF"/>
+                </a:solidFill>
+                <a:effectLst/>
+                <a:latin typeface="Courier New" panose="02070309020205020404" pitchFamily="49" charset="0"/>
+              </a:rPr>
+              <a:t>nt </a:t>
+            </a:r>
+            <a:r>
+              <a:rPr lang="en-GB" sz="500" b="1" i="0" u="none" strike="noStrike" dirty="0">
+                <a:solidFill>
+                  <a:srgbClr val="0000FF"/>
+                </a:solidFill>
+                <a:effectLst/>
+                <a:latin typeface="Courier New" panose="02070309020205020404" pitchFamily="49" charset="0"/>
+              </a:rPr>
+              <a:t>open</a:t>
+            </a:r>
+            <a:r>
+              <a:rPr lang="en-GB" sz="500" b="1" i="0" u="none" strike="noStrike" dirty="0">
+                <a:solidFill>
+                  <a:srgbClr val="B45F06"/>
+                </a:solidFill>
+                <a:effectLst/>
+                <a:latin typeface="Courier New" panose="02070309020205020404" pitchFamily="49" charset="0"/>
+              </a:rPr>
+              <a:t>(</a:t>
+            </a:r>
+            <a:r>
+              <a:rPr lang="en-GB" sz="500" b="1" i="0" u="none" strike="noStrike" dirty="0" err="1">
+                <a:solidFill>
+                  <a:srgbClr val="9900FF"/>
+                </a:solidFill>
+                <a:effectLst/>
+                <a:latin typeface="Courier New" panose="02070309020205020404" pitchFamily="49" charset="0"/>
+              </a:rPr>
+              <a:t>const</a:t>
+            </a:r>
+            <a:r>
+              <a:rPr lang="en-GB" sz="500" b="1" i="0" u="none" strike="noStrike" dirty="0">
+                <a:solidFill>
+                  <a:srgbClr val="9900FF"/>
+                </a:solidFill>
+                <a:effectLst/>
+                <a:latin typeface="Courier New" panose="02070309020205020404" pitchFamily="49" charset="0"/>
+              </a:rPr>
+              <a:t> char</a:t>
+            </a:r>
+            <a:r>
+              <a:rPr lang="en-GB" sz="500" b="1" i="0" u="none" strike="noStrike" dirty="0">
+                <a:solidFill>
+                  <a:srgbClr val="B45F06"/>
+                </a:solidFill>
+                <a:effectLst/>
+                <a:latin typeface="Courier New" panose="02070309020205020404" pitchFamily="49" charset="0"/>
+              </a:rPr>
+              <a:t>*</a:t>
+            </a:r>
+            <a:r>
+              <a:rPr lang="en-GB" sz="500" b="1" i="0" u="none" strike="noStrike" dirty="0" err="1">
+                <a:solidFill>
+                  <a:srgbClr val="B45F06"/>
+                </a:solidFill>
+                <a:effectLst/>
+                <a:latin typeface="Courier New" panose="02070309020205020404" pitchFamily="49" charset="0"/>
+              </a:rPr>
+              <a:t>name,</a:t>
+            </a:r>
+            <a:r>
+              <a:rPr lang="en-GB" sz="500" b="1" i="0" u="none" strike="noStrike" dirty="0" err="1">
+                <a:solidFill>
+                  <a:srgbClr val="9900FF"/>
+                </a:solidFill>
+                <a:effectLst/>
+                <a:latin typeface="Courier New" panose="02070309020205020404" pitchFamily="49" charset="0"/>
+              </a:rPr>
+              <a:t>int</a:t>
+            </a:r>
+            <a:r>
+              <a:rPr lang="en-GB" sz="500" b="1" i="0" u="none" strike="noStrike" dirty="0">
+                <a:solidFill>
+                  <a:srgbClr val="9900FF"/>
+                </a:solidFill>
+                <a:effectLst/>
+                <a:latin typeface="Courier New" panose="02070309020205020404" pitchFamily="49" charset="0"/>
+              </a:rPr>
+              <a:t> </a:t>
+            </a:r>
+            <a:r>
+              <a:rPr lang="en-GB" sz="500" b="1" i="0" u="none" strike="noStrike" dirty="0">
+                <a:solidFill>
+                  <a:srgbClr val="B45F06"/>
+                </a:solidFill>
+                <a:effectLst/>
+                <a:latin typeface="Courier New" panose="02070309020205020404" pitchFamily="49" charset="0"/>
+              </a:rPr>
+              <a:t>mode)</a:t>
+            </a:r>
+            <a:r>
+              <a:rPr lang="en-GB" sz="500" kern="100" spc="-43" dirty="0">
+                <a:latin typeface="Verdana" panose="020B0604030504040204" pitchFamily="34" charset="0"/>
+                <a:ea typeface="Verdana" panose="020B0604030504040204" pitchFamily="34" charset="0"/>
+              </a:rPr>
+              <a:t>Return </a:t>
+            </a:r>
+            <a:r>
+              <a:rPr lang="en-GB" sz="500" kern="100" spc="-43" dirty="0" err="1">
+                <a:latin typeface="Verdana" panose="020B0604030504040204" pitchFamily="34" charset="0"/>
+                <a:ea typeface="Verdana" panose="020B0604030504040204" pitchFamily="34" charset="0"/>
+              </a:rPr>
+              <a:t>fd</a:t>
+            </a:r>
+            <a:r>
+              <a:rPr lang="en-GB" sz="500" kern="100" spc="-43" dirty="0">
+                <a:latin typeface="Verdana" panose="020B0604030504040204" pitchFamily="34" charset="0"/>
+                <a:ea typeface="Verdana" panose="020B0604030504040204" pitchFamily="34" charset="0"/>
+              </a:rPr>
+              <a:t>. Mode 0: R, 1: W, 2: RW. </a:t>
+            </a:r>
+            <a:r>
+              <a:rPr lang="en-GB" sz="500" b="1" i="0" u="none" strike="noStrike" dirty="0">
+                <a:solidFill>
+                  <a:srgbClr val="9900FF"/>
+                </a:solidFill>
+                <a:effectLst/>
+                <a:latin typeface="Courier New" panose="02070309020205020404" pitchFamily="49" charset="0"/>
+              </a:rPr>
+              <a:t>void </a:t>
+            </a:r>
+            <a:r>
+              <a:rPr lang="en-GB" sz="500" b="1" i="0" u="none" strike="noStrike" dirty="0">
+                <a:solidFill>
+                  <a:srgbClr val="0000FF"/>
+                </a:solidFill>
+                <a:effectLst/>
+                <a:latin typeface="Courier New" panose="02070309020205020404" pitchFamily="49" charset="0"/>
+              </a:rPr>
+              <a:t>close</a:t>
+            </a:r>
+            <a:r>
+              <a:rPr lang="en-GB" sz="500" b="1" i="0" u="none" strike="noStrike" dirty="0">
+                <a:solidFill>
+                  <a:srgbClr val="B45F06"/>
+                </a:solidFill>
+                <a:effectLst/>
+                <a:latin typeface="Courier New" panose="02070309020205020404" pitchFamily="49" charset="0"/>
+              </a:rPr>
+              <a:t>(</a:t>
+            </a:r>
+            <a:r>
+              <a:rPr lang="en-GB" sz="500" b="1" i="0" u="none" strike="noStrike" dirty="0">
+                <a:solidFill>
+                  <a:srgbClr val="9900FF"/>
+                </a:solidFill>
+                <a:effectLst/>
+                <a:latin typeface="Courier New" panose="02070309020205020404" pitchFamily="49" charset="0"/>
+              </a:rPr>
+              <a:t>int </a:t>
+            </a:r>
+            <a:r>
+              <a:rPr lang="en-GB" sz="500" b="1" i="0" u="none" strike="noStrike" dirty="0" err="1">
+                <a:solidFill>
+                  <a:srgbClr val="B45F06"/>
+                </a:solidFill>
+                <a:effectLst/>
+                <a:latin typeface="Courier New" panose="02070309020205020404" pitchFamily="49" charset="0"/>
+              </a:rPr>
+              <a:t>fd</a:t>
+            </a:r>
+            <a:r>
+              <a:rPr lang="en-GB" sz="500" b="1" i="0" u="none" strike="noStrike" dirty="0">
+                <a:solidFill>
+                  <a:srgbClr val="B45F06"/>
+                </a:solidFill>
+                <a:effectLst/>
+                <a:latin typeface="Courier New" panose="02070309020205020404" pitchFamily="49" charset="0"/>
+              </a:rPr>
+              <a:t>)</a:t>
+            </a:r>
+            <a:r>
+              <a:rPr lang="en-GB" sz="500" kern="100" spc="-43" dirty="0">
+                <a:latin typeface="Verdana" panose="020B0604030504040204" pitchFamily="34" charset="0"/>
+                <a:ea typeface="Verdana" panose="020B0604030504040204" pitchFamily="34" charset="0"/>
+              </a:rPr>
+              <a:t>Closes the file or device referenced by </a:t>
+            </a:r>
+            <a:r>
+              <a:rPr lang="en-GB" sz="500" kern="100" spc="-43" dirty="0" err="1">
+                <a:latin typeface="Verdana" panose="020B0604030504040204" pitchFamily="34" charset="0"/>
+                <a:ea typeface="Verdana" panose="020B0604030504040204" pitchFamily="34" charset="0"/>
+              </a:rPr>
+              <a:t>fd</a:t>
+            </a:r>
+            <a:r>
+              <a:rPr lang="en-GB" sz="500" kern="100" spc="-43" dirty="0">
+                <a:latin typeface="Verdana" panose="020B0604030504040204" pitchFamily="34" charset="0"/>
+                <a:ea typeface="Verdana" panose="020B0604030504040204" pitchFamily="34" charset="0"/>
+              </a:rPr>
+              <a:t>. </a:t>
+            </a:r>
+            <a:r>
+              <a:rPr lang="en-GB" sz="500" b="1" i="0" u="none" strike="noStrike" dirty="0">
+                <a:solidFill>
+                  <a:srgbClr val="9900FF"/>
+                </a:solidFill>
+                <a:effectLst/>
+                <a:latin typeface="Courier New" panose="02070309020205020404" pitchFamily="49" charset="0"/>
+              </a:rPr>
+              <a:t>int </a:t>
+            </a:r>
+            <a:r>
+              <a:rPr lang="en-GB" sz="500" b="1" i="0" u="none" strike="noStrike" dirty="0">
+                <a:solidFill>
+                  <a:srgbClr val="0000FF"/>
+                </a:solidFill>
+                <a:effectLst/>
+                <a:latin typeface="Courier New" panose="02070309020205020404" pitchFamily="49" charset="0"/>
+              </a:rPr>
+              <a:t>read</a:t>
+            </a:r>
+            <a:r>
+              <a:rPr lang="en-GB" sz="500" b="1" i="0" u="none" strike="noStrike" dirty="0">
+                <a:solidFill>
+                  <a:srgbClr val="B45F06"/>
+                </a:solidFill>
+                <a:effectLst/>
+                <a:latin typeface="Courier New" panose="02070309020205020404" pitchFamily="49" charset="0"/>
+              </a:rPr>
+              <a:t>(</a:t>
+            </a:r>
+            <a:r>
+              <a:rPr lang="en-GB" sz="500" b="1" i="0" u="none" strike="noStrike" dirty="0">
+                <a:solidFill>
+                  <a:srgbClr val="9900FF"/>
+                </a:solidFill>
+                <a:effectLst/>
+                <a:latin typeface="Courier New" panose="02070309020205020404" pitchFamily="49" charset="0"/>
+              </a:rPr>
+              <a:t>int </a:t>
+            </a:r>
+            <a:r>
+              <a:rPr lang="en-GB" sz="500" b="1" i="0" u="none" strike="noStrike" dirty="0" err="1">
+                <a:solidFill>
+                  <a:srgbClr val="B45F06"/>
+                </a:solidFill>
+                <a:effectLst/>
+                <a:latin typeface="Courier New" panose="02070309020205020404" pitchFamily="49" charset="0"/>
+              </a:rPr>
+              <a:t>fd</a:t>
+            </a:r>
+            <a:r>
+              <a:rPr lang="en-GB" sz="500" b="1" i="0" u="none" strike="noStrike" dirty="0">
+                <a:solidFill>
+                  <a:srgbClr val="B45F06"/>
+                </a:solidFill>
+                <a:effectLst/>
+                <a:latin typeface="Courier New" panose="02070309020205020404" pitchFamily="49" charset="0"/>
+              </a:rPr>
+              <a:t>, </a:t>
+            </a:r>
+            <a:r>
+              <a:rPr lang="en-GB" sz="500" b="1" i="0" u="none" strike="noStrike" dirty="0">
+                <a:solidFill>
+                  <a:srgbClr val="9900FF"/>
+                </a:solidFill>
+                <a:effectLst/>
+                <a:latin typeface="Courier New" panose="02070309020205020404" pitchFamily="49" charset="0"/>
+              </a:rPr>
+              <a:t>void </a:t>
+            </a:r>
+            <a:r>
+              <a:rPr lang="en-GB" sz="500" b="1" i="0" u="none" strike="noStrike" dirty="0">
+                <a:solidFill>
+                  <a:srgbClr val="B45F06"/>
+                </a:solidFill>
+                <a:effectLst/>
+                <a:latin typeface="Courier New" panose="02070309020205020404" pitchFamily="49" charset="0"/>
+              </a:rPr>
+              <a:t>*buffer, </a:t>
+            </a:r>
+            <a:r>
+              <a:rPr lang="en-GB" sz="500" b="1" i="0" u="none" strike="noStrike" dirty="0">
+                <a:solidFill>
+                  <a:srgbClr val="9900FF"/>
+                </a:solidFill>
+                <a:effectLst/>
+                <a:latin typeface="Courier New" panose="02070309020205020404" pitchFamily="49" charset="0"/>
+              </a:rPr>
+              <a:t>int </a:t>
+            </a:r>
+            <a:r>
+              <a:rPr lang="en-GB" sz="500" b="1" i="0" u="none" strike="noStrike" dirty="0" err="1">
+                <a:solidFill>
+                  <a:srgbClr val="B45F06"/>
+                </a:solidFill>
+                <a:effectLst/>
+                <a:latin typeface="Courier New" panose="02070309020205020404" pitchFamily="49" charset="0"/>
+              </a:rPr>
+              <a:t>numbytes</a:t>
+            </a:r>
+            <a:r>
+              <a:rPr lang="en-GB" sz="500" b="1" i="0" u="none" strike="noStrike" dirty="0">
+                <a:solidFill>
+                  <a:srgbClr val="B45F06"/>
+                </a:solidFill>
+                <a:effectLst/>
+                <a:latin typeface="Courier New" panose="02070309020205020404" pitchFamily="49" charset="0"/>
+              </a:rPr>
+              <a:t>)</a:t>
+            </a:r>
+            <a:r>
+              <a:rPr lang="en-GB" sz="500" kern="100" spc="-43" dirty="0">
+                <a:latin typeface="Verdana" panose="020B0604030504040204" pitchFamily="34" charset="0"/>
+                <a:ea typeface="Verdana" panose="020B0604030504040204" pitchFamily="34" charset="0"/>
+              </a:rPr>
+              <a:t>Returns the number of bytes read. Reads </a:t>
+            </a:r>
+            <a:r>
+              <a:rPr lang="en-GB" sz="500" kern="100" spc="-43" dirty="0" err="1">
+                <a:latin typeface="Verdana" panose="020B0604030504040204" pitchFamily="34" charset="0"/>
+                <a:ea typeface="Verdana" panose="020B0604030504040204" pitchFamily="34" charset="0"/>
+              </a:rPr>
+              <a:t>numbytes</a:t>
+            </a:r>
+            <a:r>
+              <a:rPr lang="en-GB" sz="500" kern="100" spc="-43" dirty="0">
+                <a:latin typeface="Verdana" panose="020B0604030504040204" pitchFamily="34" charset="0"/>
+                <a:ea typeface="Verdana" panose="020B0604030504040204" pitchFamily="34" charset="0"/>
+              </a:rPr>
+              <a:t> from file open as </a:t>
+            </a:r>
+            <a:r>
+              <a:rPr lang="en-GB" sz="500" kern="100" spc="-43" dirty="0" err="1">
+                <a:latin typeface="Verdana" panose="020B0604030504040204" pitchFamily="34" charset="0"/>
+                <a:ea typeface="Verdana" panose="020B0604030504040204" pitchFamily="34" charset="0"/>
+              </a:rPr>
+              <a:t>fd</a:t>
+            </a:r>
+            <a:r>
+              <a:rPr lang="en-GB" sz="500" kern="100" spc="-43" dirty="0">
+                <a:latin typeface="Verdana" panose="020B0604030504040204" pitchFamily="34" charset="0"/>
+                <a:ea typeface="Verdana" panose="020B0604030504040204" pitchFamily="34" charset="0"/>
+              </a:rPr>
+              <a:t> into buffer. </a:t>
+            </a:r>
+            <a:r>
+              <a:rPr lang="en-GB" sz="500" b="1" i="0" u="none" strike="noStrike" dirty="0">
+                <a:solidFill>
+                  <a:srgbClr val="9900FF"/>
+                </a:solidFill>
+                <a:effectLst/>
+                <a:latin typeface="Courier New" panose="02070309020205020404" pitchFamily="49" charset="0"/>
+              </a:rPr>
+              <a:t>int </a:t>
+            </a:r>
+            <a:r>
+              <a:rPr lang="en-GB" sz="500" b="1" i="0" u="none" strike="noStrike" dirty="0">
+                <a:solidFill>
+                  <a:srgbClr val="0000FF"/>
+                </a:solidFill>
+                <a:effectLst/>
+                <a:latin typeface="Courier New" panose="02070309020205020404" pitchFamily="49" charset="0"/>
+              </a:rPr>
+              <a:t>write</a:t>
+            </a:r>
+            <a:r>
+              <a:rPr lang="en-GB" sz="500" b="1" i="0" u="none" strike="noStrike" dirty="0">
+                <a:solidFill>
+                  <a:srgbClr val="B45F06"/>
+                </a:solidFill>
+                <a:effectLst/>
+                <a:latin typeface="Courier New" panose="02070309020205020404" pitchFamily="49" charset="0"/>
+              </a:rPr>
+              <a:t>(</a:t>
+            </a:r>
+            <a:r>
+              <a:rPr lang="en-GB" sz="500" b="1" i="0" u="none" strike="noStrike" dirty="0">
+                <a:solidFill>
+                  <a:srgbClr val="9900FF"/>
+                </a:solidFill>
+                <a:effectLst/>
+                <a:latin typeface="Courier New" panose="02070309020205020404" pitchFamily="49" charset="0"/>
+              </a:rPr>
+              <a:t>int </a:t>
+            </a:r>
+            <a:r>
+              <a:rPr lang="en-GB" sz="500" b="1" i="0" u="none" strike="noStrike" dirty="0" err="1">
+                <a:solidFill>
+                  <a:srgbClr val="B45F06"/>
+                </a:solidFill>
+                <a:effectLst/>
+                <a:latin typeface="Courier New" panose="02070309020205020404" pitchFamily="49" charset="0"/>
+              </a:rPr>
+              <a:t>fd</a:t>
+            </a:r>
+            <a:r>
+              <a:rPr lang="en-GB" sz="500" b="1" i="0" u="none" strike="noStrike" dirty="0">
+                <a:solidFill>
+                  <a:srgbClr val="B45F06"/>
+                </a:solidFill>
+                <a:effectLst/>
+                <a:latin typeface="Courier New" panose="02070309020205020404" pitchFamily="49" charset="0"/>
+              </a:rPr>
+              <a:t>, </a:t>
+            </a:r>
+            <a:r>
+              <a:rPr lang="en-GB" sz="500" b="1" i="0" u="none" strike="noStrike" dirty="0">
+                <a:solidFill>
+                  <a:srgbClr val="9900FF"/>
+                </a:solidFill>
+                <a:effectLst/>
+                <a:latin typeface="Courier New" panose="02070309020205020404" pitchFamily="49" charset="0"/>
+              </a:rPr>
+              <a:t>void </a:t>
+            </a:r>
+            <a:r>
+              <a:rPr lang="en-GB" sz="500" b="1" i="0" u="none" strike="noStrike" dirty="0">
+                <a:solidFill>
+                  <a:srgbClr val="B45F06"/>
+                </a:solidFill>
+                <a:effectLst/>
+                <a:latin typeface="Courier New" panose="02070309020205020404" pitchFamily="49" charset="0"/>
+              </a:rPr>
+              <a:t>*buffer, </a:t>
+            </a:r>
+            <a:r>
+              <a:rPr lang="en-GB" sz="500" b="1" i="0" u="none" strike="noStrike" dirty="0">
+                <a:solidFill>
+                  <a:srgbClr val="9900FF"/>
+                </a:solidFill>
+                <a:effectLst/>
+                <a:latin typeface="Courier New" panose="02070309020205020404" pitchFamily="49" charset="0"/>
+              </a:rPr>
+              <a:t>int </a:t>
+            </a:r>
+            <a:r>
+              <a:rPr lang="en-GB" sz="500" b="1" i="0" u="none" strike="noStrike" dirty="0" err="1">
+                <a:solidFill>
+                  <a:srgbClr val="B45F06"/>
+                </a:solidFill>
+                <a:effectLst/>
+                <a:latin typeface="Courier New" panose="02070309020205020404" pitchFamily="49" charset="0"/>
+              </a:rPr>
+              <a:t>numbytes</a:t>
+            </a:r>
+            <a:r>
+              <a:rPr lang="en-GB" sz="500" b="1" i="0" u="none" strike="noStrike" dirty="0">
+                <a:solidFill>
+                  <a:srgbClr val="B45F06"/>
+                </a:solidFill>
+                <a:effectLst/>
+                <a:latin typeface="Courier New" panose="02070309020205020404" pitchFamily="49" charset="0"/>
+              </a:rPr>
+              <a:t>)</a:t>
+            </a:r>
+            <a:r>
+              <a:rPr lang="en-GB" sz="500" kern="100" spc="-43" dirty="0">
+                <a:latin typeface="Verdana" panose="020B0604030504040204" pitchFamily="34" charset="0"/>
+                <a:ea typeface="Verdana" panose="020B0604030504040204" pitchFamily="34" charset="0"/>
+              </a:rPr>
+              <a:t> Returns the number of bytes written. Writes </a:t>
+            </a:r>
+            <a:r>
+              <a:rPr lang="en-GB" sz="500" kern="100" spc="-43" dirty="0" err="1">
+                <a:latin typeface="Verdana" panose="020B0604030504040204" pitchFamily="34" charset="0"/>
+                <a:ea typeface="Verdana" panose="020B0604030504040204" pitchFamily="34" charset="0"/>
+              </a:rPr>
+              <a:t>numbytes</a:t>
+            </a:r>
+            <a:r>
+              <a:rPr lang="en-GB" sz="500" kern="100" spc="-43" dirty="0">
+                <a:latin typeface="Verdana" panose="020B0604030504040204" pitchFamily="34" charset="0"/>
+                <a:ea typeface="Verdana" panose="020B0604030504040204" pitchFamily="34" charset="0"/>
+              </a:rPr>
+              <a:t> from buffer into file open as </a:t>
+            </a:r>
+            <a:r>
+              <a:rPr lang="en-GB" sz="500" kern="100" spc="-43" dirty="0" err="1">
+                <a:latin typeface="Verdana" panose="020B0604030504040204" pitchFamily="34" charset="0"/>
+                <a:ea typeface="Verdana" panose="020B0604030504040204" pitchFamily="34" charset="0"/>
+              </a:rPr>
+              <a:t>fd</a:t>
+            </a:r>
+            <a:r>
+              <a:rPr lang="en-GB" sz="500" kern="100" spc="-43" dirty="0">
+                <a:latin typeface="Verdana" panose="020B0604030504040204" pitchFamily="34" charset="0"/>
+                <a:ea typeface="Verdana" panose="020B0604030504040204" pitchFamily="34" charset="0"/>
+              </a:rPr>
+              <a:t>. </a:t>
+            </a:r>
+            <a:r>
+              <a:rPr lang="en-GB" sz="500" b="1" i="0" u="none" strike="noStrike" dirty="0">
+                <a:solidFill>
+                  <a:srgbClr val="9900FF"/>
+                </a:solidFill>
+                <a:effectLst/>
+                <a:latin typeface="Courier New" panose="02070309020205020404" pitchFamily="49" charset="0"/>
+              </a:rPr>
+              <a:t>void </a:t>
+            </a:r>
+            <a:r>
+              <a:rPr lang="en-GB" sz="500" b="1" i="0" u="none" strike="noStrike" dirty="0">
+                <a:solidFill>
+                  <a:srgbClr val="0000FF"/>
+                </a:solidFill>
+                <a:effectLst/>
+                <a:latin typeface="Courier New" panose="02070309020205020404" pitchFamily="49" charset="0"/>
+              </a:rPr>
+              <a:t>pipe</a:t>
+            </a:r>
+            <a:r>
+              <a:rPr lang="en-GB" sz="500" b="1" i="0" u="none" strike="noStrike" dirty="0">
+                <a:solidFill>
+                  <a:srgbClr val="B45F06"/>
+                </a:solidFill>
+                <a:effectLst/>
+                <a:latin typeface="Courier New" panose="02070309020205020404" pitchFamily="49" charset="0"/>
+              </a:rPr>
+              <a:t>(</a:t>
+            </a:r>
+            <a:r>
+              <a:rPr lang="en-GB" sz="500" b="1" i="0" u="none" strike="noStrike" dirty="0">
+                <a:solidFill>
+                  <a:srgbClr val="9900FF"/>
+                </a:solidFill>
+                <a:effectLst/>
+                <a:latin typeface="Courier New" panose="02070309020205020404" pitchFamily="49" charset="0"/>
+              </a:rPr>
+              <a:t>int* </a:t>
+            </a:r>
+            <a:r>
+              <a:rPr lang="en-GB" sz="500" b="1" i="0" u="none" strike="noStrike" dirty="0" err="1">
+                <a:solidFill>
+                  <a:srgbClr val="B45F06"/>
+                </a:solidFill>
+                <a:effectLst/>
+                <a:latin typeface="Courier New" panose="02070309020205020404" pitchFamily="49" charset="0"/>
+              </a:rPr>
+              <a:t>fds</a:t>
+            </a:r>
+            <a:r>
+              <a:rPr lang="en-GB" sz="500" b="1" i="0" u="none" strike="noStrike" dirty="0">
+                <a:solidFill>
+                  <a:srgbClr val="B45F06"/>
+                </a:solidFill>
+                <a:effectLst/>
+                <a:latin typeface="Courier New" panose="02070309020205020404" pitchFamily="49" charset="0"/>
+              </a:rPr>
+              <a:t>)</a:t>
+            </a:r>
+            <a:r>
+              <a:rPr lang="en-GB" sz="500" kern="100" spc="-43" dirty="0">
+                <a:latin typeface="Verdana" panose="020B0604030504040204" pitchFamily="34" charset="0"/>
+                <a:ea typeface="Verdana" panose="020B0604030504040204" pitchFamily="34" charset="0"/>
+              </a:rPr>
+              <a:t> Creates a pipe. </a:t>
+            </a:r>
+            <a:r>
+              <a:rPr lang="en-GB" sz="500" kern="100" spc="-43" dirty="0" err="1">
+                <a:latin typeface="Verdana" panose="020B0604030504040204" pitchFamily="34" charset="0"/>
+                <a:ea typeface="Verdana" panose="020B0604030504040204" pitchFamily="34" charset="0"/>
+              </a:rPr>
+              <a:t>fd</a:t>
+            </a:r>
+            <a:r>
+              <a:rPr lang="en-GB" sz="500" kern="100" spc="-43" dirty="0">
+                <a:latin typeface="Verdana" panose="020B0604030504040204" pitchFamily="34" charset="0"/>
+                <a:ea typeface="Verdana" panose="020B0604030504040204" pitchFamily="34" charset="0"/>
+              </a:rPr>
+              <a:t> is an array of two </a:t>
+            </a:r>
+            <a:r>
+              <a:rPr lang="en-GB" sz="500" kern="100" spc="-43" dirty="0" err="1">
+                <a:latin typeface="Verdana" panose="020B0604030504040204" pitchFamily="34" charset="0"/>
+                <a:ea typeface="Verdana" panose="020B0604030504040204" pitchFamily="34" charset="0"/>
+              </a:rPr>
+              <a:t>ints</a:t>
+            </a:r>
+            <a:r>
+              <a:rPr lang="en-GB" sz="500" kern="100" spc="-43" dirty="0">
+                <a:latin typeface="Verdana" panose="020B0604030504040204" pitchFamily="34" charset="0"/>
+                <a:ea typeface="Verdana" panose="020B0604030504040204" pitchFamily="34" charset="0"/>
+              </a:rPr>
+              <a:t>: </a:t>
+            </a:r>
+            <a:r>
+              <a:rPr lang="en-GB" sz="500" kern="100" spc="-43" dirty="0" err="1">
+                <a:latin typeface="Verdana" panose="020B0604030504040204" pitchFamily="34" charset="0"/>
+                <a:ea typeface="Verdana" panose="020B0604030504040204" pitchFamily="34" charset="0"/>
+              </a:rPr>
+              <a:t>fd</a:t>
+            </a:r>
+            <a:r>
+              <a:rPr lang="en-GB" sz="500" kern="100" spc="-43" dirty="0">
+                <a:latin typeface="Verdana" panose="020B0604030504040204" pitchFamily="34" charset="0"/>
+                <a:ea typeface="Verdana" panose="020B0604030504040204" pitchFamily="34" charset="0"/>
+              </a:rPr>
+              <a:t>[0] is for reading, </a:t>
+            </a:r>
+            <a:r>
+              <a:rPr lang="en-GB" sz="500" kern="100" spc="-43" dirty="0" err="1">
+                <a:latin typeface="Verdana" panose="020B0604030504040204" pitchFamily="34" charset="0"/>
+                <a:ea typeface="Verdana" panose="020B0604030504040204" pitchFamily="34" charset="0"/>
+              </a:rPr>
+              <a:t>fd</a:t>
+            </a:r>
+            <a:r>
+              <a:rPr lang="en-GB" sz="500" kern="100" spc="-43" dirty="0">
+                <a:latin typeface="Verdana" panose="020B0604030504040204" pitchFamily="34" charset="0"/>
+                <a:ea typeface="Verdana" panose="020B0604030504040204" pitchFamily="34" charset="0"/>
+              </a:rPr>
+              <a:t>[1] is for writing.  dup and dup2 duplicate </a:t>
+            </a:r>
+            <a:r>
+              <a:rPr lang="en-GB" sz="500" kern="100" spc="-43" dirty="0" err="1">
+                <a:latin typeface="Verdana" panose="020B0604030504040204" pitchFamily="34" charset="0"/>
+                <a:ea typeface="Verdana" panose="020B0604030504040204" pitchFamily="34" charset="0"/>
+              </a:rPr>
+              <a:t>fds</a:t>
+            </a:r>
+            <a:r>
+              <a:rPr lang="en-GB" sz="500" kern="100" spc="-43" dirty="0">
+                <a:latin typeface="Verdana" panose="020B0604030504040204" pitchFamily="34" charset="0"/>
+                <a:ea typeface="Verdana" panose="020B0604030504040204" pitchFamily="34" charset="0"/>
+              </a:rPr>
+              <a:t>, dup returns it, dup2 takes in the return param. </a:t>
+            </a:r>
+            <a:r>
+              <a:rPr lang="en-GB" sz="500" b="1" i="0" u="none" strike="noStrike" dirty="0">
+                <a:solidFill>
+                  <a:srgbClr val="9900FF"/>
+                </a:solidFill>
+                <a:effectLst/>
+                <a:latin typeface="Courier New" panose="02070309020205020404" pitchFamily="49" charset="0"/>
+              </a:rPr>
+              <a:t>void</a:t>
+            </a:r>
+            <a:r>
+              <a:rPr lang="en-GB" sz="500" b="1" i="0" u="none" strike="noStrike" dirty="0">
+                <a:solidFill>
+                  <a:srgbClr val="000000"/>
+                </a:solidFill>
+                <a:effectLst/>
+                <a:latin typeface="Courier New" panose="02070309020205020404" pitchFamily="49" charset="0"/>
+              </a:rPr>
+              <a:t> </a:t>
+            </a:r>
+            <a:r>
+              <a:rPr lang="en-GB" sz="500" b="1" i="0" u="none" strike="noStrike" dirty="0" err="1">
+                <a:solidFill>
+                  <a:srgbClr val="0000FF"/>
+                </a:solidFill>
+                <a:effectLst/>
+                <a:latin typeface="Courier New" panose="02070309020205020404" pitchFamily="49" charset="0"/>
+              </a:rPr>
+              <a:t>ioctl</a:t>
+            </a:r>
+            <a:r>
+              <a:rPr lang="en-GB" sz="500" b="1" i="0" u="none" strike="noStrike" dirty="0">
+                <a:solidFill>
+                  <a:srgbClr val="000000"/>
+                </a:solidFill>
+                <a:effectLst/>
+                <a:latin typeface="Courier New" panose="02070309020205020404" pitchFamily="49" charset="0"/>
+              </a:rPr>
+              <a:t>(fd,op,&amp;</a:t>
+            </a:r>
+            <a:r>
+              <a:rPr lang="en-GB" sz="500" b="1" i="0" u="none" strike="noStrike" dirty="0" err="1">
+                <a:solidFill>
+                  <a:srgbClr val="000000"/>
+                </a:solidFill>
+                <a:effectLst/>
+                <a:latin typeface="Courier New" panose="02070309020205020404" pitchFamily="49" charset="0"/>
+              </a:rPr>
+              <a:t>termios</a:t>
+            </a:r>
+            <a:r>
+              <a:rPr lang="en-GB" sz="500" b="1" i="0" u="none" strike="noStrike" dirty="0">
+                <a:solidFill>
+                  <a:srgbClr val="000000"/>
+                </a:solidFill>
+                <a:effectLst/>
+                <a:latin typeface="Courier New" panose="02070309020205020404" pitchFamily="49" charset="0"/>
+              </a:rPr>
+              <a:t>);</a:t>
+            </a:r>
+            <a:r>
+              <a:rPr lang="en-GB" sz="500" kern="100" spc="-43" dirty="0">
+                <a:solidFill>
+                  <a:srgbClr val="000000"/>
+                </a:solidFill>
+                <a:latin typeface="Verdana" panose="020B0604030504040204" pitchFamily="34" charset="0"/>
+                <a:ea typeface="Verdana" panose="020B0604030504040204" pitchFamily="34" charset="0"/>
+              </a:rPr>
+              <a:t> Used to c</a:t>
+            </a:r>
+            <a:r>
+              <a:rPr lang="en-GB" sz="500" kern="100" spc="-43" dirty="0">
+                <a:latin typeface="Verdana" panose="020B0604030504040204" pitchFamily="34" charset="0"/>
+                <a:ea typeface="Verdana" panose="020B0604030504040204" pitchFamily="34" charset="0"/>
+              </a:rPr>
+              <a:t>ontrol io devices, </a:t>
+            </a:r>
+            <a:r>
+              <a:rPr lang="en-GB" sz="500" kern="100" spc="-43" dirty="0" err="1">
+                <a:latin typeface="Verdana" panose="020B0604030504040204" pitchFamily="34" charset="0"/>
+                <a:ea typeface="Verdana" panose="020B0604030504040204" pitchFamily="34" charset="0"/>
+              </a:rPr>
+              <a:t>termios</a:t>
+            </a:r>
+            <a:r>
+              <a:rPr lang="en-GB" sz="500" kern="100" spc="-43" dirty="0">
+                <a:latin typeface="Verdana" panose="020B0604030504040204" pitchFamily="34" charset="0"/>
+                <a:ea typeface="Verdana" panose="020B0604030504040204" pitchFamily="34" charset="0"/>
+              </a:rPr>
+              <a:t> = array of control chars. </a:t>
+            </a:r>
+            <a:r>
+              <a:rPr lang="en-GB" sz="500" b="1" kern="100" spc="-43" dirty="0" err="1">
+                <a:latin typeface="Courier New" panose="02070309020205020404" pitchFamily="49" charset="0"/>
+                <a:ea typeface="Verdana" panose="020B0604030504040204" pitchFamily="34" charset="0"/>
+                <a:cs typeface="Courier New" panose="02070309020205020404" pitchFamily="49" charset="0"/>
+              </a:rPr>
+              <a:t>fd</a:t>
+            </a:r>
+            <a:r>
+              <a:rPr lang="en-GB" sz="500" b="1" kern="100" spc="-43" dirty="0">
+                <a:latin typeface="Courier New" panose="02070309020205020404" pitchFamily="49" charset="0"/>
+                <a:ea typeface="Verdana" panose="020B0604030504040204" pitchFamily="34" charset="0"/>
+                <a:cs typeface="Courier New" panose="02070309020205020404" pitchFamily="49" charset="0"/>
+              </a:rPr>
+              <a:t> = </a:t>
+            </a:r>
+            <a:r>
+              <a:rPr lang="en-GB" sz="500" b="1" kern="100" spc="-43" dirty="0" err="1">
+                <a:solidFill>
+                  <a:srgbClr val="0000FF"/>
+                </a:solidFill>
+                <a:latin typeface="Courier New" panose="02070309020205020404" pitchFamily="49" charset="0"/>
+                <a:ea typeface="Verdana" panose="020B0604030504040204" pitchFamily="34" charset="0"/>
+                <a:cs typeface="Courier New" panose="02070309020205020404" pitchFamily="49" charset="0"/>
+              </a:rPr>
+              <a:t>mknod</a:t>
+            </a:r>
+            <a:r>
+              <a:rPr lang="en-GB" sz="500" b="1" kern="100" spc="-43" dirty="0">
+                <a:latin typeface="Courier New" panose="02070309020205020404" pitchFamily="49" charset="0"/>
+                <a:ea typeface="Verdana" panose="020B0604030504040204" pitchFamily="34" charset="0"/>
+                <a:cs typeface="Courier New" panose="02070309020205020404" pitchFamily="49" charset="0"/>
+              </a:rPr>
+              <a:t>(filename, permission, dev); </a:t>
+            </a:r>
+            <a:r>
+              <a:rPr lang="en-GB" sz="500" kern="100" spc="-43" dirty="0" err="1">
+                <a:latin typeface="Verdana" panose="020B0604030504040204" pitchFamily="34" charset="0"/>
+                <a:ea typeface="Verdana" panose="020B0604030504040204" pitchFamily="34" charset="0"/>
+              </a:rPr>
+              <a:t>mknod</a:t>
+            </a:r>
+            <a:r>
+              <a:rPr lang="en-GB" sz="500" kern="100" spc="-43" dirty="0">
+                <a:latin typeface="Verdana" panose="020B0604030504040204" pitchFamily="34" charset="0"/>
+                <a:ea typeface="Verdana" panose="020B0604030504040204" pitchFamily="34" charset="0"/>
+              </a:rPr>
+              <a:t> creates a new special file e.g. a character or block device</a:t>
             </a:r>
           </a:p>
           <a:p>
@@ -15299,91 +16178,11 @@
               </a:spcAft>
             </a:pPr>
             <a:r>
-              <a:rPr lang="en-GB" sz="500" b="1" i="0" u="none" strike="noStrike" dirty="0">
-                <a:solidFill>
-                  <a:srgbClr val="9900FF"/>
-                </a:solidFill>
-                <a:effectLst/>
-                <a:latin typeface="Courier New" panose="02070309020205020404" pitchFamily="49" charset="0"/>
-              </a:rPr>
-              <a:t>int </a:t>
-            </a:r>
-            <a:r>
-              <a:rPr lang="en-GB" sz="500" b="1" i="0" u="none" strike="noStrike" dirty="0">
-                <a:solidFill>
-                  <a:srgbClr val="0000FF"/>
-                </a:solidFill>
-                <a:effectLst/>
-                <a:latin typeface="Courier New" panose="02070309020205020404" pitchFamily="49" charset="0"/>
-              </a:rPr>
-              <a:t>create</a:t>
-            </a:r>
-            <a:r>
-              <a:rPr lang="en-GB" sz="500" b="1" i="0" u="none" strike="noStrike" dirty="0">
-                <a:solidFill>
-                  <a:srgbClr val="B45F06"/>
-                </a:solidFill>
-                <a:effectLst/>
-                <a:latin typeface="Courier New" panose="02070309020205020404" pitchFamily="49" charset="0"/>
-              </a:rPr>
-              <a:t>(</a:t>
-            </a:r>
-            <a:r>
-              <a:rPr lang="en-GB" sz="500" b="1" i="0" u="none" strike="noStrike" dirty="0" err="1">
-                <a:solidFill>
-                  <a:srgbClr val="9900FF"/>
-                </a:solidFill>
-                <a:effectLst/>
-                <a:latin typeface="Courier New" panose="02070309020205020404" pitchFamily="49" charset="0"/>
-              </a:rPr>
-              <a:t>const</a:t>
-            </a:r>
-            <a:r>
-              <a:rPr lang="en-GB" sz="500" b="1" i="0" u="none" strike="noStrike" dirty="0">
-                <a:solidFill>
-                  <a:srgbClr val="9900FF"/>
-                </a:solidFill>
-                <a:effectLst/>
-                <a:latin typeface="Courier New" panose="02070309020205020404" pitchFamily="49" charset="0"/>
-              </a:rPr>
-              <a:t> char</a:t>
-            </a:r>
-            <a:r>
-              <a:rPr lang="en-GB" sz="500" b="1" i="0" u="none" strike="noStrike" dirty="0">
-                <a:solidFill>
-                  <a:srgbClr val="B45F06"/>
-                </a:solidFill>
-                <a:effectLst/>
-                <a:latin typeface="Courier New" panose="02070309020205020404" pitchFamily="49" charset="0"/>
-              </a:rPr>
-              <a:t>* path, </a:t>
-            </a:r>
-            <a:r>
-              <a:rPr lang="en-GB" sz="500" b="1" i="0" u="none" strike="noStrike" dirty="0">
-                <a:solidFill>
-                  <a:srgbClr val="9900FF"/>
-                </a:solidFill>
-                <a:effectLst/>
-                <a:latin typeface="Courier New" panose="02070309020205020404" pitchFamily="49" charset="0"/>
-              </a:rPr>
-              <a:t>int </a:t>
-            </a:r>
-            <a:r>
-              <a:rPr lang="en-GB" sz="500" b="1" i="0" u="none" strike="noStrike" dirty="0">
-                <a:solidFill>
-                  <a:srgbClr val="B45F06"/>
-                </a:solidFill>
-                <a:effectLst/>
-                <a:latin typeface="Courier New" panose="02070309020205020404" pitchFamily="49" charset="0"/>
-              </a:rPr>
-              <a:t>perm)</a:t>
-            </a:r>
-            <a:r>
-              <a:rPr lang="en-GB" sz="500" kern="100" spc="-43" dirty="0">
-                <a:latin typeface="Verdana" panose="020B0604030504040204" pitchFamily="34" charset="0"/>
-                <a:ea typeface="Verdana" panose="020B0604030504040204" pitchFamily="34" charset="0"/>
-              </a:rPr>
-              <a:t>Returns an </a:t>
+              <a:rPr lang="en-GB" sz="500" kern="100" spc="-43" dirty="0">
+                <a:latin typeface="Verdana" panose="020B0604030504040204" pitchFamily="34" charset="0"/>
+                <a:ea typeface="Verdana" panose="020B0604030504040204" pitchFamily="34" charset="0"/>
+              </a:rPr>
+              <a:t>Processes have unique </a:t>
             </a:r>
             <a:r>
               <a:rPr lang="en-GB" sz="500" kern="100" spc="-43" dirty="0" err="1">
@@ -15397,8 +16196,40 @@
                 <a:latin typeface="Verdana" panose="020B0604030504040204" pitchFamily="34" charset="0"/>
                 <a:ea typeface="Verdana" panose="020B0604030504040204" pitchFamily="34" charset="0"/>
               </a:rPr>
-              <a:t>, takes a file path and opens it for reading and writing (makes file object). perm for access control</a:t>
-            </a:r>
+              <a:t> tables. When a process is created it has 3 </a:t>
+            </a:r>
+            <a:r>
+              <a:rPr lang="en-GB" sz="500" kern="100" spc="-43" dirty="0" err="1">
+                <a:latin typeface="Verdana" panose="020B0604030504040204" pitchFamily="34" charset="0"/>
+                <a:ea typeface="Verdana" panose="020B0604030504040204" pitchFamily="34" charset="0"/>
+              </a:rPr>
+              <a:t>fds</a:t>
+            </a:r>
+            <a:r>
+              <a:rPr lang="en-GB" sz="500" kern="100" spc="-43" dirty="0">
+                <a:latin typeface="Verdana" panose="020B0604030504040204" pitchFamily="34" charset="0"/>
+                <a:ea typeface="Verdana" panose="020B0604030504040204" pitchFamily="34" charset="0"/>
+              </a:rPr>
+              <a:t>, stdin, </a:t>
+            </a:r>
+            <a:r>
+              <a:rPr lang="en-GB" sz="500" kern="100" spc="-43" dirty="0" err="1">
+                <a:latin typeface="Verdana" panose="020B0604030504040204" pitchFamily="34" charset="0"/>
+                <a:ea typeface="Verdana" panose="020B0604030504040204" pitchFamily="34" charset="0"/>
+              </a:rPr>
+              <a:t>stdout</a:t>
+            </a:r>
+            <a:r>
+              <a:rPr lang="en-GB" sz="500" kern="100" spc="-43" dirty="0">
+                <a:latin typeface="Verdana" panose="020B0604030504040204" pitchFamily="34" charset="0"/>
+                <a:ea typeface="Verdana" panose="020B0604030504040204" pitchFamily="34" charset="0"/>
+              </a:rPr>
+              <a:t>, stderr. By default they all refer to terminal from which the program started.</a:t>
+            </a:r>
+            <a:endParaRPr lang="en-GB" sz="500" b="1" u="sng" kern="100" spc="-43" dirty="0">
+              <a:latin typeface="Verdana" panose="020B0604030504040204" pitchFamily="34" charset="0"/>
+              <a:ea typeface="Verdana" panose="020B0604030504040204" pitchFamily="34" charset="0"/>
+            </a:endParaRPr>
           </a:p>
           <a:p>
             <a:pPr rtl="0">
@@ -15410,918 +16241,43 @@
               </a:spcAft>
             </a:pPr>
             <a:r>
-              <a:rPr lang="en-GB" sz="500" b="1" dirty="0">
-                <a:solidFill>
-                  <a:srgbClr val="9900FF"/>
-                </a:solidFill>
-                <a:latin typeface="Courier New" panose="02070309020205020404" pitchFamily="49" charset="0"/>
-              </a:rPr>
-              <a:t>i</a:t>
-            </a:r>
-            <a:r>
-              <a:rPr lang="en-GB" sz="500" b="1" i="0" u="none" strike="noStrike" dirty="0">
-                <a:solidFill>
-                  <a:srgbClr val="9900FF"/>
-                </a:solidFill>
-                <a:effectLst/>
-                <a:latin typeface="Courier New" panose="02070309020205020404" pitchFamily="49" charset="0"/>
-              </a:rPr>
-              <a:t>nt </a:t>
-            </a:r>
-            <a:r>
-              <a:rPr lang="en-GB" sz="500" b="1" i="0" u="none" strike="noStrike" dirty="0">
-                <a:solidFill>
-                  <a:srgbClr val="0000FF"/>
-                </a:solidFill>
-                <a:effectLst/>
-                <a:latin typeface="Courier New" panose="02070309020205020404" pitchFamily="49" charset="0"/>
-              </a:rPr>
-              <a:t>open</a:t>
-            </a:r>
-            <a:r>
-              <a:rPr lang="en-GB" sz="500" b="1" i="0" u="none" strike="noStrike" dirty="0">
-                <a:solidFill>
-                  <a:srgbClr val="B45F06"/>
-                </a:solidFill>
-                <a:effectLst/>
-                <a:latin typeface="Courier New" panose="02070309020205020404" pitchFamily="49" charset="0"/>
-              </a:rPr>
-              <a:t>(</a:t>
-            </a:r>
-            <a:r>
-              <a:rPr lang="en-GB" sz="500" b="1" i="0" u="none" strike="noStrike" dirty="0" err="1">
-                <a:solidFill>
-                  <a:srgbClr val="9900FF"/>
-                </a:solidFill>
-                <a:effectLst/>
-                <a:latin typeface="Courier New" panose="02070309020205020404" pitchFamily="49" charset="0"/>
-              </a:rPr>
-              <a:t>const</a:t>
-            </a:r>
-            <a:r>
-              <a:rPr lang="en-GB" sz="500" b="1" i="0" u="none" strike="noStrike" dirty="0">
-                <a:solidFill>
-                  <a:srgbClr val="9900FF"/>
-                </a:solidFill>
-                <a:effectLst/>
-                <a:latin typeface="Courier New" panose="02070309020205020404" pitchFamily="49" charset="0"/>
-              </a:rPr>
-              <a:t> char</a:t>
-            </a:r>
-            <a:r>
-              <a:rPr lang="en-GB" sz="500" b="1" i="0" u="none" strike="noStrike" dirty="0">
-                <a:solidFill>
-                  <a:srgbClr val="B45F06"/>
-                </a:solidFill>
-                <a:effectLst/>
-                <a:latin typeface="Courier New" panose="02070309020205020404" pitchFamily="49" charset="0"/>
-              </a:rPr>
-              <a:t>*</a:t>
-            </a:r>
-            <a:r>
-              <a:rPr lang="en-GB" sz="500" b="1" i="0" u="none" strike="noStrike" dirty="0" err="1">
-                <a:solidFill>
-                  <a:srgbClr val="B45F06"/>
-                </a:solidFill>
-                <a:effectLst/>
-                <a:latin typeface="Courier New" panose="02070309020205020404" pitchFamily="49" charset="0"/>
-              </a:rPr>
-              <a:t>name,</a:t>
-            </a:r>
-            <a:r>
-              <a:rPr lang="en-GB" sz="500" b="1" i="0" u="none" strike="noStrike" dirty="0" err="1">
-                <a:solidFill>
-                  <a:srgbClr val="9900FF"/>
-                </a:solidFill>
-                <a:effectLst/>
-                <a:latin typeface="Courier New" panose="02070309020205020404" pitchFamily="49" charset="0"/>
-              </a:rPr>
-              <a:t>int</a:t>
-            </a:r>
-            <a:r>
-              <a:rPr lang="en-GB" sz="500" b="1" i="0" u="none" strike="noStrike" dirty="0">
-                <a:solidFill>
-                  <a:srgbClr val="9900FF"/>
-                </a:solidFill>
-                <a:effectLst/>
-                <a:latin typeface="Courier New" panose="02070309020205020404" pitchFamily="49" charset="0"/>
-              </a:rPr>
-              <a:t> </a:t>
-            </a:r>
-            <a:r>
-              <a:rPr lang="en-GB" sz="500" b="1" i="0" u="none" strike="noStrike" dirty="0">
-                <a:solidFill>
-                  <a:srgbClr val="B45F06"/>
-                </a:solidFill>
-                <a:effectLst/>
-                <a:latin typeface="Courier New" panose="02070309020205020404" pitchFamily="49" charset="0"/>
-              </a:rPr>
-              <a:t>mode)</a:t>
-            </a:r>
-            <a:r>
-              <a:rPr lang="en-GB" sz="500" kern="100" spc="-43" dirty="0">
-                <a:latin typeface="Verdana" panose="020B0604030504040204" pitchFamily="34" charset="0"/>
-                <a:ea typeface="Verdana" panose="020B0604030504040204" pitchFamily="34" charset="0"/>
-              </a:rPr>
-              <a:t>Return </a:t>
-            </a:r>
-            <a:r>
-              <a:rPr lang="en-GB" sz="500" kern="100" spc="-43" dirty="0" err="1">
-                <a:latin typeface="Verdana" panose="020B0604030504040204" pitchFamily="34" charset="0"/>
-                <a:ea typeface="Verdana" panose="020B0604030504040204" pitchFamily="34" charset="0"/>
-              </a:rPr>
-              <a:t>fd</a:t>
-            </a:r>
-            <a:r>
-              <a:rPr lang="en-GB" sz="500" kern="100" spc="-43" dirty="0">
-                <a:latin typeface="Verdana" panose="020B0604030504040204" pitchFamily="34" charset="0"/>
-                <a:ea typeface="Verdana" panose="020B0604030504040204" pitchFamily="34" charset="0"/>
-              </a:rPr>
-              <a:t>. Mode 0: R, 1: W, 2: RW</a:t>
-            </a:r>
-          </a:p>
-          <a:p>
-            <a:pPr rtl="0">
-              <a:spcBef>
-                <a:spcPts val="0"/>
-              </a:spcBef>
-              <a:spcAft>
-                <a:spcPts val="0"/>
-              </a:spcAft>
-            </a:pPr>
-            <a:r>
-              <a:rPr lang="en-GB" sz="500" b="1" i="0" u="none" strike="noStrike" dirty="0">
-                <a:solidFill>
-                  <a:srgbClr val="9900FF"/>
-                </a:solidFill>
-                <a:effectLst/>
-                <a:latin typeface="Courier New" panose="02070309020205020404" pitchFamily="49" charset="0"/>
-              </a:rPr>
-              <a:t>void </a:t>
-            </a:r>
-            <a:r>
-              <a:rPr lang="en-GB" sz="500" b="1" i="0" u="none" strike="noStrike" dirty="0">
-                <a:solidFill>
-                  <a:srgbClr val="0000FF"/>
-                </a:solidFill>
-                <a:effectLst/>
-                <a:latin typeface="Courier New" panose="02070309020205020404" pitchFamily="49" charset="0"/>
-              </a:rPr>
-              <a:t>close</a:t>
-            </a:r>
-            <a:r>
-              <a:rPr lang="en-GB" sz="500" b="1" i="0" u="none" strike="noStrike" dirty="0">
-                <a:solidFill>
-                  <a:srgbClr val="B45F06"/>
-                </a:solidFill>
-                <a:effectLst/>
-                <a:latin typeface="Courier New" panose="02070309020205020404" pitchFamily="49" charset="0"/>
-              </a:rPr>
-              <a:t>(</a:t>
-            </a:r>
-            <a:r>
-              <a:rPr lang="en-GB" sz="500" b="1" i="0" u="none" strike="noStrike" dirty="0">
-                <a:solidFill>
-                  <a:srgbClr val="9900FF"/>
-                </a:solidFill>
-                <a:effectLst/>
-                <a:latin typeface="Courier New" panose="02070309020205020404" pitchFamily="49" charset="0"/>
-              </a:rPr>
-              <a:t>int </a:t>
-            </a:r>
-            <a:r>
-              <a:rPr lang="en-GB" sz="500" b="1" i="0" u="none" strike="noStrike" dirty="0" err="1">
-                <a:solidFill>
-                  <a:srgbClr val="B45F06"/>
-                </a:solidFill>
-                <a:effectLst/>
-                <a:latin typeface="Courier New" panose="02070309020205020404" pitchFamily="49" charset="0"/>
-              </a:rPr>
-              <a:t>fd</a:t>
-            </a:r>
-            <a:r>
-              <a:rPr lang="en-GB" sz="500" b="1" i="0" u="none" strike="noStrike" dirty="0">
-                <a:solidFill>
-                  <a:srgbClr val="B45F06"/>
-                </a:solidFill>
-                <a:effectLst/>
-                <a:latin typeface="Courier New" panose="02070309020205020404" pitchFamily="49" charset="0"/>
-              </a:rPr>
-              <a:t>)</a:t>
-            </a:r>
-            <a:r>
-              <a:rPr lang="en-GB" sz="500" kern="100" spc="-43" dirty="0">
-                <a:latin typeface="Verdana" panose="020B0604030504040204" pitchFamily="34" charset="0"/>
-                <a:ea typeface="Verdana" panose="020B0604030504040204" pitchFamily="34" charset="0"/>
-              </a:rPr>
-              <a:t>Closes the file or device referenced by </a:t>
-            </a:r>
-            <a:r>
-              <a:rPr lang="en-GB" sz="500" kern="100" spc="-43" dirty="0" err="1">
-                <a:latin typeface="Verdana" panose="020B0604030504040204" pitchFamily="34" charset="0"/>
-                <a:ea typeface="Verdana" panose="020B0604030504040204" pitchFamily="34" charset="0"/>
-              </a:rPr>
-              <a:t>fd</a:t>
-            </a:r>
-            <a:r>
-              <a:rPr lang="en-GB" sz="500" kern="100" spc="-43" dirty="0">
-                <a:latin typeface="Verdana" panose="020B0604030504040204" pitchFamily="34" charset="0"/>
-                <a:ea typeface="Verdana" panose="020B0604030504040204" pitchFamily="34" charset="0"/>
-              </a:rPr>
-              <a:t>.</a:t>
-            </a:r>
-          </a:p>
-          <a:p>
-            <a:pPr rtl="0">
-              <a:spcBef>
-                <a:spcPts val="0"/>
-              </a:spcBef>
-              <a:spcAft>
-                <a:spcPts val="0"/>
-              </a:spcAft>
-            </a:pPr>
-            <a:r>
-              <a:rPr lang="en-GB" sz="500" b="1" i="0" u="none" strike="noStrike" dirty="0">
-                <a:solidFill>
-                  <a:srgbClr val="9900FF"/>
-                </a:solidFill>
-                <a:effectLst/>
-                <a:latin typeface="Courier New" panose="02070309020205020404" pitchFamily="49" charset="0"/>
-              </a:rPr>
-              <a:t>int </a:t>
-            </a:r>
-            <a:r>
-              <a:rPr lang="en-GB" sz="500" b="1" i="0" u="none" strike="noStrike" dirty="0">
-                <a:solidFill>
-                  <a:srgbClr val="0000FF"/>
-                </a:solidFill>
-                <a:effectLst/>
-                <a:latin typeface="Courier New" panose="02070309020205020404" pitchFamily="49" charset="0"/>
-              </a:rPr>
-              <a:t>read</a:t>
-            </a:r>
-            <a:r>
-              <a:rPr lang="en-GB" sz="500" b="1" i="0" u="none" strike="noStrike" dirty="0">
-                <a:solidFill>
-                  <a:srgbClr val="B45F06"/>
-                </a:solidFill>
-                <a:effectLst/>
-                <a:latin typeface="Courier New" panose="02070309020205020404" pitchFamily="49" charset="0"/>
-              </a:rPr>
-              <a:t>(</a:t>
-            </a:r>
-            <a:r>
-              <a:rPr lang="en-GB" sz="500" b="1" i="0" u="none" strike="noStrike" dirty="0">
-                <a:solidFill>
-                  <a:srgbClr val="9900FF"/>
-                </a:solidFill>
-                <a:effectLst/>
-                <a:latin typeface="Courier New" panose="02070309020205020404" pitchFamily="49" charset="0"/>
-              </a:rPr>
-              <a:t>int </a:t>
-            </a:r>
-            <a:r>
-              <a:rPr lang="en-GB" sz="500" b="1" i="0" u="none" strike="noStrike" dirty="0" err="1">
-                <a:solidFill>
-                  <a:srgbClr val="B45F06"/>
-                </a:solidFill>
-                <a:effectLst/>
-                <a:latin typeface="Courier New" panose="02070309020205020404" pitchFamily="49" charset="0"/>
-              </a:rPr>
-              <a:t>fd</a:t>
-            </a:r>
-            <a:r>
-              <a:rPr lang="en-GB" sz="500" b="1" i="0" u="none" strike="noStrike" dirty="0">
-                <a:solidFill>
-                  <a:srgbClr val="B45F06"/>
-                </a:solidFill>
-                <a:effectLst/>
-                <a:latin typeface="Courier New" panose="02070309020205020404" pitchFamily="49" charset="0"/>
-              </a:rPr>
-              <a:t>, </a:t>
-            </a:r>
-            <a:r>
-              <a:rPr lang="en-GB" sz="500" b="1" i="0" u="none" strike="noStrike" dirty="0">
-                <a:solidFill>
-                  <a:srgbClr val="9900FF"/>
-                </a:solidFill>
-                <a:effectLst/>
-                <a:latin typeface="Courier New" panose="02070309020205020404" pitchFamily="49" charset="0"/>
-              </a:rPr>
-              <a:t>void </a:t>
-            </a:r>
-            <a:r>
-              <a:rPr lang="en-GB" sz="500" b="1" i="0" u="none" strike="noStrike" dirty="0">
-                <a:solidFill>
-                  <a:srgbClr val="B45F06"/>
-                </a:solidFill>
-                <a:effectLst/>
-                <a:latin typeface="Courier New" panose="02070309020205020404" pitchFamily="49" charset="0"/>
-              </a:rPr>
-              <a:t>*buffer, </a:t>
-            </a:r>
-            <a:r>
-              <a:rPr lang="en-GB" sz="500" b="1" i="0" u="none" strike="noStrike" dirty="0">
-                <a:solidFill>
-                  <a:srgbClr val="9900FF"/>
-                </a:solidFill>
-                <a:effectLst/>
-                <a:latin typeface="Courier New" panose="02070309020205020404" pitchFamily="49" charset="0"/>
-              </a:rPr>
-              <a:t>int </a:t>
-            </a:r>
-            <a:r>
-              <a:rPr lang="en-GB" sz="500" b="1" i="0" u="none" strike="noStrike" dirty="0" err="1">
-                <a:solidFill>
-                  <a:srgbClr val="B45F06"/>
-                </a:solidFill>
-                <a:effectLst/>
-                <a:latin typeface="Courier New" panose="02070309020205020404" pitchFamily="49" charset="0"/>
-              </a:rPr>
-              <a:t>numbytes</a:t>
-            </a:r>
-            <a:r>
-              <a:rPr lang="en-GB" sz="500" b="1" i="0" u="none" strike="noStrike" dirty="0">
-                <a:solidFill>
-                  <a:srgbClr val="B45F06"/>
-                </a:solidFill>
-                <a:effectLst/>
-                <a:latin typeface="Courier New" panose="02070309020205020404" pitchFamily="49" charset="0"/>
-              </a:rPr>
-              <a:t>)</a:t>
-            </a:r>
-            <a:r>
-              <a:rPr lang="en-GB" sz="500" kern="100" spc="-43" dirty="0">
-                <a:latin typeface="Verdana" panose="020B0604030504040204" pitchFamily="34" charset="0"/>
-                <a:ea typeface="Verdana" panose="020B0604030504040204" pitchFamily="34" charset="0"/>
-              </a:rPr>
-              <a:t>Returns the number of bytes read. Reads </a:t>
-            </a:r>
-            <a:r>
-              <a:rPr lang="en-GB" sz="500" kern="100" spc="-43" dirty="0" err="1">
-                <a:latin typeface="Verdana" panose="020B0604030504040204" pitchFamily="34" charset="0"/>
-                <a:ea typeface="Verdana" panose="020B0604030504040204" pitchFamily="34" charset="0"/>
-              </a:rPr>
-              <a:t>numbytes</a:t>
-            </a:r>
-            <a:r>
-              <a:rPr lang="en-GB" sz="500" kern="100" spc="-43" dirty="0">
-                <a:latin typeface="Verdana" panose="020B0604030504040204" pitchFamily="34" charset="0"/>
-                <a:ea typeface="Verdana" panose="020B0604030504040204" pitchFamily="34" charset="0"/>
-              </a:rPr>
-              <a:t> from file open as </a:t>
-            </a:r>
-            <a:r>
-              <a:rPr lang="en-GB" sz="500" kern="100" spc="-43" dirty="0" err="1">
-                <a:latin typeface="Verdana" panose="020B0604030504040204" pitchFamily="34" charset="0"/>
-                <a:ea typeface="Verdana" panose="020B0604030504040204" pitchFamily="34" charset="0"/>
-              </a:rPr>
-              <a:t>fd</a:t>
-            </a:r>
-            <a:r>
-              <a:rPr lang="en-GB" sz="500" kern="100" spc="-43" dirty="0">
-                <a:latin typeface="Verdana" panose="020B0604030504040204" pitchFamily="34" charset="0"/>
-                <a:ea typeface="Verdana" panose="020B0604030504040204" pitchFamily="34" charset="0"/>
-              </a:rPr>
-              <a:t> into buffer.</a:t>
-            </a:r>
-          </a:p>
-          <a:p>
-            <a:pPr rtl="0">
-              <a:spcBef>
-                <a:spcPts val="0"/>
-              </a:spcBef>
-              <a:spcAft>
-                <a:spcPts val="0"/>
-              </a:spcAft>
-            </a:pPr>
-            <a:r>
-              <a:rPr lang="en-GB" sz="500" b="1" i="0" u="none" strike="noStrike" dirty="0">
-                <a:solidFill>
-                  <a:srgbClr val="9900FF"/>
-                </a:solidFill>
-                <a:effectLst/>
-                <a:latin typeface="Courier New" panose="02070309020205020404" pitchFamily="49" charset="0"/>
-              </a:rPr>
-              <a:t>int </a:t>
-            </a:r>
-            <a:r>
-              <a:rPr lang="en-GB" sz="500" b="1" i="0" u="none" strike="noStrike" dirty="0">
-                <a:solidFill>
-                  <a:srgbClr val="0000FF"/>
-                </a:solidFill>
-                <a:effectLst/>
-                <a:latin typeface="Courier New" panose="02070309020205020404" pitchFamily="49" charset="0"/>
-              </a:rPr>
-              <a:t>write</a:t>
-            </a:r>
-            <a:r>
-              <a:rPr lang="en-GB" sz="500" b="1" i="0" u="none" strike="noStrike" dirty="0">
-                <a:solidFill>
-                  <a:srgbClr val="B45F06"/>
-                </a:solidFill>
-                <a:effectLst/>
-                <a:latin typeface="Courier New" panose="02070309020205020404" pitchFamily="49" charset="0"/>
-              </a:rPr>
-              <a:t>(</a:t>
-            </a:r>
-            <a:r>
-              <a:rPr lang="en-GB" sz="500" b="1" i="0" u="none" strike="noStrike" dirty="0">
-                <a:solidFill>
-                  <a:srgbClr val="9900FF"/>
-                </a:solidFill>
-                <a:effectLst/>
-                <a:latin typeface="Courier New" panose="02070309020205020404" pitchFamily="49" charset="0"/>
-              </a:rPr>
-              <a:t>int </a:t>
-            </a:r>
-            <a:r>
-              <a:rPr lang="en-GB" sz="500" b="1" i="0" u="none" strike="noStrike" dirty="0" err="1">
-                <a:solidFill>
-                  <a:srgbClr val="B45F06"/>
-                </a:solidFill>
-                <a:effectLst/>
-                <a:latin typeface="Courier New" panose="02070309020205020404" pitchFamily="49" charset="0"/>
-              </a:rPr>
-              <a:t>fd</a:t>
-            </a:r>
-            <a:r>
-              <a:rPr lang="en-GB" sz="500" b="1" i="0" u="none" strike="noStrike" dirty="0">
-                <a:solidFill>
-                  <a:srgbClr val="B45F06"/>
-                </a:solidFill>
-                <a:effectLst/>
-                <a:latin typeface="Courier New" panose="02070309020205020404" pitchFamily="49" charset="0"/>
-              </a:rPr>
-              <a:t>, </a:t>
-            </a:r>
-            <a:r>
-              <a:rPr lang="en-GB" sz="500" b="1" i="0" u="none" strike="noStrike" dirty="0">
-                <a:solidFill>
-                  <a:srgbClr val="9900FF"/>
-                </a:solidFill>
-                <a:effectLst/>
-                <a:latin typeface="Courier New" panose="02070309020205020404" pitchFamily="49" charset="0"/>
-              </a:rPr>
-              <a:t>void </a:t>
-            </a:r>
-            <a:r>
-              <a:rPr lang="en-GB" sz="500" b="1" i="0" u="none" strike="noStrike" dirty="0">
-                <a:solidFill>
-                  <a:srgbClr val="B45F06"/>
-                </a:solidFill>
-                <a:effectLst/>
-                <a:latin typeface="Courier New" panose="02070309020205020404" pitchFamily="49" charset="0"/>
-              </a:rPr>
-              <a:t>*buffer, </a:t>
-            </a:r>
-            <a:r>
-              <a:rPr lang="en-GB" sz="500" b="1" i="0" u="none" strike="noStrike" dirty="0">
-                <a:solidFill>
-                  <a:srgbClr val="9900FF"/>
-                </a:solidFill>
-                <a:effectLst/>
-                <a:latin typeface="Courier New" panose="02070309020205020404" pitchFamily="49" charset="0"/>
-              </a:rPr>
-              <a:t>int </a:t>
-            </a:r>
-            <a:r>
-              <a:rPr lang="en-GB" sz="500" b="1" i="0" u="none" strike="noStrike" dirty="0" err="1">
-                <a:solidFill>
-                  <a:srgbClr val="B45F06"/>
-                </a:solidFill>
-                <a:effectLst/>
-                <a:latin typeface="Courier New" panose="02070309020205020404" pitchFamily="49" charset="0"/>
-              </a:rPr>
-              <a:t>numbytes</a:t>
-            </a:r>
-            <a:r>
-              <a:rPr lang="en-GB" sz="500" b="1" i="0" u="none" strike="noStrike" dirty="0">
-                <a:solidFill>
-                  <a:srgbClr val="B45F06"/>
-                </a:solidFill>
-                <a:effectLst/>
-                <a:latin typeface="Courier New" panose="02070309020205020404" pitchFamily="49" charset="0"/>
-              </a:rPr>
-              <a:t>)</a:t>
-            </a:r>
-            <a:r>
-              <a:rPr lang="en-GB" sz="500" kern="100" spc="-43" dirty="0">
-                <a:latin typeface="Verdana" panose="020B0604030504040204" pitchFamily="34" charset="0"/>
-                <a:ea typeface="Verdana" panose="020B0604030504040204" pitchFamily="34" charset="0"/>
-              </a:rPr>
-              <a:t> Returns the number of bytes written. Writes </a:t>
-            </a:r>
-            <a:r>
-              <a:rPr lang="en-GB" sz="500" kern="100" spc="-43" dirty="0" err="1">
-                <a:latin typeface="Verdana" panose="020B0604030504040204" pitchFamily="34" charset="0"/>
-                <a:ea typeface="Verdana" panose="020B0604030504040204" pitchFamily="34" charset="0"/>
-              </a:rPr>
-              <a:t>numbytes</a:t>
-            </a:r>
-            <a:r>
-              <a:rPr lang="en-GB" sz="500" kern="100" spc="-43" dirty="0">
-                <a:latin typeface="Verdana" panose="020B0604030504040204" pitchFamily="34" charset="0"/>
-                <a:ea typeface="Verdana" panose="020B0604030504040204" pitchFamily="34" charset="0"/>
-              </a:rPr>
-              <a:t> from buffer into file open as </a:t>
-            </a:r>
-            <a:r>
-              <a:rPr lang="en-GB" sz="500" kern="100" spc="-43" dirty="0" err="1">
-                <a:latin typeface="Verdana" panose="020B0604030504040204" pitchFamily="34" charset="0"/>
-                <a:ea typeface="Verdana" panose="020B0604030504040204" pitchFamily="34" charset="0"/>
-              </a:rPr>
-              <a:t>fd</a:t>
-            </a:r>
-            <a:r>
-              <a:rPr lang="en-GB" sz="500" kern="100" spc="-43" dirty="0">
-                <a:latin typeface="Verdana" panose="020B0604030504040204" pitchFamily="34" charset="0"/>
-                <a:ea typeface="Verdana" panose="020B0604030504040204" pitchFamily="34" charset="0"/>
-              </a:rPr>
-              <a:t>.</a:t>
-            </a:r>
-          </a:p>
-          <a:p>
-            <a:pPr rtl="0">
-              <a:spcBef>
-                <a:spcPts val="0"/>
-              </a:spcBef>
-              <a:spcAft>
-                <a:spcPts val="0"/>
-              </a:spcAft>
-            </a:pPr>
-            <a:r>
-              <a:rPr lang="en-GB" sz="500" b="1" i="0" u="none" strike="noStrike" dirty="0">
-                <a:solidFill>
-                  <a:srgbClr val="9900FF"/>
-                </a:solidFill>
-                <a:effectLst/>
-                <a:latin typeface="Courier New" panose="02070309020205020404" pitchFamily="49" charset="0"/>
-              </a:rPr>
-              <a:t>void </a:t>
-            </a:r>
-            <a:r>
-              <a:rPr lang="en-GB" sz="500" b="1" i="0" u="none" strike="noStrike" dirty="0">
-                <a:solidFill>
-                  <a:srgbClr val="0000FF"/>
-                </a:solidFill>
-                <a:effectLst/>
-                <a:latin typeface="Courier New" panose="02070309020205020404" pitchFamily="49" charset="0"/>
-              </a:rPr>
-              <a:t>pipe</a:t>
-            </a:r>
-            <a:r>
-              <a:rPr lang="en-GB" sz="500" b="1" i="0" u="none" strike="noStrike" dirty="0">
-                <a:solidFill>
-                  <a:srgbClr val="B45F06"/>
-                </a:solidFill>
-                <a:effectLst/>
-                <a:latin typeface="Courier New" panose="02070309020205020404" pitchFamily="49" charset="0"/>
-              </a:rPr>
-              <a:t>(</a:t>
-            </a:r>
-            <a:r>
-              <a:rPr lang="en-GB" sz="500" b="1" i="0" u="none" strike="noStrike" dirty="0">
-                <a:solidFill>
-                  <a:srgbClr val="9900FF"/>
-                </a:solidFill>
-                <a:effectLst/>
-                <a:latin typeface="Courier New" panose="02070309020205020404" pitchFamily="49" charset="0"/>
-              </a:rPr>
-              <a:t>int* </a:t>
-            </a:r>
-            <a:r>
-              <a:rPr lang="en-GB" sz="500" b="1" i="0" u="none" strike="noStrike" dirty="0" err="1">
-                <a:solidFill>
-                  <a:srgbClr val="B45F06"/>
-                </a:solidFill>
-                <a:effectLst/>
-                <a:latin typeface="Courier New" panose="02070309020205020404" pitchFamily="49" charset="0"/>
-              </a:rPr>
-              <a:t>fds</a:t>
-            </a:r>
-            <a:r>
-              <a:rPr lang="en-GB" sz="500" b="1" i="0" u="none" strike="noStrike" dirty="0">
-                <a:solidFill>
-                  <a:srgbClr val="B45F06"/>
-                </a:solidFill>
-                <a:effectLst/>
-                <a:latin typeface="Courier New" panose="02070309020205020404" pitchFamily="49" charset="0"/>
-              </a:rPr>
-              <a:t>)</a:t>
-            </a:r>
-            <a:r>
-              <a:rPr lang="en-GB" sz="500" kern="100" spc="-43" dirty="0">
-                <a:latin typeface="Verdana" panose="020B0604030504040204" pitchFamily="34" charset="0"/>
-                <a:ea typeface="Verdana" panose="020B0604030504040204" pitchFamily="34" charset="0"/>
-              </a:rPr>
-              <a:t> Creates a pipe. </a:t>
-            </a:r>
-            <a:r>
-              <a:rPr lang="en-GB" sz="500" kern="100" spc="-43" dirty="0" err="1">
-                <a:latin typeface="Verdana" panose="020B0604030504040204" pitchFamily="34" charset="0"/>
-                <a:ea typeface="Verdana" panose="020B0604030504040204" pitchFamily="34" charset="0"/>
-              </a:rPr>
-              <a:t>fd</a:t>
-            </a:r>
-            <a:r>
-              <a:rPr lang="en-GB" sz="500" kern="100" spc="-43" dirty="0">
-                <a:latin typeface="Verdana" panose="020B0604030504040204" pitchFamily="34" charset="0"/>
-                <a:ea typeface="Verdana" panose="020B0604030504040204" pitchFamily="34" charset="0"/>
-              </a:rPr>
-              <a:t> is an array of two </a:t>
-            </a:r>
-            <a:r>
-              <a:rPr lang="en-GB" sz="500" kern="100" spc="-43" dirty="0" err="1">
-                <a:latin typeface="Verdana" panose="020B0604030504040204" pitchFamily="34" charset="0"/>
-                <a:ea typeface="Verdana" panose="020B0604030504040204" pitchFamily="34" charset="0"/>
-              </a:rPr>
-              <a:t>ints</a:t>
-            </a:r>
-            <a:r>
-              <a:rPr lang="en-GB" sz="500" kern="100" spc="-43" dirty="0">
-                <a:latin typeface="Verdana" panose="020B0604030504040204" pitchFamily="34" charset="0"/>
-                <a:ea typeface="Verdana" panose="020B0604030504040204" pitchFamily="34" charset="0"/>
-              </a:rPr>
-              <a:t>: </a:t>
-            </a:r>
-            <a:r>
-              <a:rPr lang="en-GB" sz="500" kern="100" spc="-43" dirty="0" err="1">
-                <a:latin typeface="Verdana" panose="020B0604030504040204" pitchFamily="34" charset="0"/>
-                <a:ea typeface="Verdana" panose="020B0604030504040204" pitchFamily="34" charset="0"/>
-              </a:rPr>
-              <a:t>fd</a:t>
-            </a:r>
-            <a:r>
-              <a:rPr lang="en-GB" sz="500" kern="100" spc="-43" dirty="0">
-                <a:latin typeface="Verdana" panose="020B0604030504040204" pitchFamily="34" charset="0"/>
-                <a:ea typeface="Verdana" panose="020B0604030504040204" pitchFamily="34" charset="0"/>
-              </a:rPr>
-              <a:t>[0] is for reading, </a:t>
-            </a:r>
-            <a:r>
-              <a:rPr lang="en-GB" sz="500" kern="100" spc="-43" dirty="0" err="1">
-                <a:latin typeface="Verdana" panose="020B0604030504040204" pitchFamily="34" charset="0"/>
-                <a:ea typeface="Verdana" panose="020B0604030504040204" pitchFamily="34" charset="0"/>
-              </a:rPr>
-              <a:t>fd</a:t>
-            </a:r>
-            <a:r>
-              <a:rPr lang="en-GB" sz="500" kern="100" spc="-43" dirty="0">
-                <a:latin typeface="Verdana" panose="020B0604030504040204" pitchFamily="34" charset="0"/>
-                <a:ea typeface="Verdana" panose="020B0604030504040204" pitchFamily="34" charset="0"/>
-              </a:rPr>
-              <a:t>[1] is for writing.  dup and dup2 duplicate </a:t>
-            </a:r>
-            <a:r>
-              <a:rPr lang="en-GB" sz="500" kern="100" spc="-43" dirty="0" err="1">
-                <a:latin typeface="Verdana" panose="020B0604030504040204" pitchFamily="34" charset="0"/>
-                <a:ea typeface="Verdana" panose="020B0604030504040204" pitchFamily="34" charset="0"/>
-              </a:rPr>
-              <a:t>fds</a:t>
-            </a:r>
-            <a:r>
-              <a:rPr lang="en-GB" sz="500" kern="100" spc="-43" dirty="0">
-                <a:latin typeface="Verdana" panose="020B0604030504040204" pitchFamily="34" charset="0"/>
-                <a:ea typeface="Verdana" panose="020B0604030504040204" pitchFamily="34" charset="0"/>
-              </a:rPr>
-              <a:t>, dup returns it, dup2 takes in the return param.</a:t>
-            </a:r>
-          </a:p>
-          <a:p>
-            <a:pPr rtl="0">
-              <a:spcBef>
-                <a:spcPts val="0"/>
-              </a:spcBef>
-              <a:spcAft>
-                <a:spcPts val="0"/>
-              </a:spcAft>
-            </a:pPr>
-            <a:r>
-              <a:rPr lang="en-GB" sz="500" kern="100" spc="-43" dirty="0">
-                <a:latin typeface="Verdana" panose="020B0604030504040204" pitchFamily="34" charset="0"/>
-                <a:ea typeface="Verdana" panose="020B0604030504040204" pitchFamily="34" charset="0"/>
-              </a:rPr>
-              <a:t> </a:t>
-            </a:r>
-            <a:r>
-              <a:rPr lang="en-GB" sz="500" b="1" i="0" u="none" strike="noStrike" dirty="0">
-                <a:solidFill>
-                  <a:srgbClr val="9900FF"/>
-                </a:solidFill>
-                <a:effectLst/>
-                <a:latin typeface="Courier New" panose="02070309020205020404" pitchFamily="49" charset="0"/>
-              </a:rPr>
-              <a:t>void</a:t>
-            </a:r>
-            <a:r>
-              <a:rPr lang="en-GB" sz="500" b="1" i="0" u="none" strike="noStrike" dirty="0">
-                <a:solidFill>
-                  <a:srgbClr val="000000"/>
-                </a:solidFill>
-                <a:effectLst/>
-                <a:latin typeface="Courier New" panose="02070309020205020404" pitchFamily="49" charset="0"/>
-              </a:rPr>
-              <a:t> </a:t>
-            </a:r>
-            <a:r>
-              <a:rPr lang="en-GB" sz="500" b="1" i="0" u="none" strike="noStrike" dirty="0" err="1">
-                <a:solidFill>
-                  <a:srgbClr val="0000FF"/>
-                </a:solidFill>
-                <a:effectLst/>
-                <a:latin typeface="Courier New" panose="02070309020205020404" pitchFamily="49" charset="0"/>
-              </a:rPr>
-              <a:t>ioctl</a:t>
-            </a:r>
-            <a:r>
-              <a:rPr lang="en-GB" sz="500" b="1" i="0" u="none" strike="noStrike" dirty="0">
-                <a:solidFill>
-                  <a:srgbClr val="000000"/>
-                </a:solidFill>
-                <a:effectLst/>
-                <a:latin typeface="Courier New" panose="02070309020205020404" pitchFamily="49" charset="0"/>
-              </a:rPr>
-              <a:t>(fd,op,&amp;</a:t>
-            </a:r>
-            <a:r>
-              <a:rPr lang="en-GB" sz="500" b="1" i="0" u="none" strike="noStrike" dirty="0" err="1">
-                <a:solidFill>
-                  <a:srgbClr val="000000"/>
-                </a:solidFill>
-                <a:effectLst/>
-                <a:latin typeface="Courier New" panose="02070309020205020404" pitchFamily="49" charset="0"/>
-              </a:rPr>
-              <a:t>termios</a:t>
-            </a:r>
-            <a:r>
-              <a:rPr lang="en-GB" sz="500" b="1" i="0" u="none" strike="noStrike" dirty="0">
-                <a:solidFill>
-                  <a:srgbClr val="000000"/>
-                </a:solidFill>
-                <a:effectLst/>
-                <a:latin typeface="Courier New" panose="02070309020205020404" pitchFamily="49" charset="0"/>
-              </a:rPr>
-              <a:t>);</a:t>
-            </a:r>
-            <a:r>
-              <a:rPr lang="en-GB" sz="500" kern="100" spc="-43" dirty="0">
-                <a:solidFill>
-                  <a:srgbClr val="000000"/>
-                </a:solidFill>
-                <a:latin typeface="Verdana" panose="020B0604030504040204" pitchFamily="34" charset="0"/>
-                <a:ea typeface="Verdana" panose="020B0604030504040204" pitchFamily="34" charset="0"/>
-              </a:rPr>
-              <a:t> Used to c</a:t>
-            </a:r>
-            <a:r>
-              <a:rPr lang="en-GB" sz="500" kern="100" spc="-43" dirty="0">
-                <a:latin typeface="Verdana" panose="020B0604030504040204" pitchFamily="34" charset="0"/>
-                <a:ea typeface="Verdana" panose="020B0604030504040204" pitchFamily="34" charset="0"/>
-              </a:rPr>
-              <a:t>ontrol io devices, </a:t>
-            </a:r>
-            <a:r>
-              <a:rPr lang="en-GB" sz="500" kern="100" spc="-43" dirty="0" err="1">
-                <a:latin typeface="Verdana" panose="020B0604030504040204" pitchFamily="34" charset="0"/>
-                <a:ea typeface="Verdana" panose="020B0604030504040204" pitchFamily="34" charset="0"/>
-              </a:rPr>
-              <a:t>termios</a:t>
-            </a:r>
-            <a:r>
-              <a:rPr lang="en-GB" sz="500" kern="100" spc="-43" dirty="0">
-                <a:latin typeface="Verdana" panose="020B0604030504040204" pitchFamily="34" charset="0"/>
-                <a:ea typeface="Verdana" panose="020B0604030504040204" pitchFamily="34" charset="0"/>
-              </a:rPr>
-              <a:t> = array of control chars.</a:t>
-            </a:r>
-          </a:p>
-          <a:p>
-            <a:pPr rtl="0">
-              <a:spcBef>
-                <a:spcPts val="0"/>
-              </a:spcBef>
-              <a:spcAft>
-                <a:spcPts val="0"/>
-              </a:spcAft>
-            </a:pPr>
-            <a:r>
-              <a:rPr lang="en-GB" sz="500" kern="100" spc="-43" dirty="0">
-                <a:latin typeface="Verdana" panose="020B0604030504040204" pitchFamily="34" charset="0"/>
-                <a:ea typeface="Verdana" panose="020B0604030504040204" pitchFamily="34" charset="0"/>
-              </a:rPr>
-              <a:t> </a:t>
-            </a:r>
-            <a:r>
-              <a:rPr lang="en-GB" sz="500" b="1" kern="100" spc="-43" dirty="0" err="1">
-                <a:latin typeface="Courier New" panose="02070309020205020404" pitchFamily="49" charset="0"/>
-                <a:ea typeface="Verdana" panose="020B0604030504040204" pitchFamily="34" charset="0"/>
-                <a:cs typeface="Courier New" panose="02070309020205020404" pitchFamily="49" charset="0"/>
-              </a:rPr>
-              <a:t>fd</a:t>
-            </a:r>
-            <a:r>
-              <a:rPr lang="en-GB" sz="500" b="1" kern="100" spc="-43" dirty="0">
-                <a:latin typeface="Courier New" panose="02070309020205020404" pitchFamily="49" charset="0"/>
-                <a:ea typeface="Verdana" panose="020B0604030504040204" pitchFamily="34" charset="0"/>
-                <a:cs typeface="Courier New" panose="02070309020205020404" pitchFamily="49" charset="0"/>
-              </a:rPr>
-              <a:t> = </a:t>
-            </a:r>
-            <a:r>
-              <a:rPr lang="en-GB" sz="500" b="1" kern="100" spc="-43" dirty="0" err="1">
-                <a:solidFill>
-                  <a:srgbClr val="0000FF"/>
-                </a:solidFill>
-                <a:latin typeface="Courier New" panose="02070309020205020404" pitchFamily="49" charset="0"/>
-                <a:ea typeface="Verdana" panose="020B0604030504040204" pitchFamily="34" charset="0"/>
-                <a:cs typeface="Courier New" panose="02070309020205020404" pitchFamily="49" charset="0"/>
-              </a:rPr>
-              <a:t>mknod</a:t>
-            </a:r>
-            <a:r>
-              <a:rPr lang="en-GB" sz="500" b="1" kern="100" spc="-43" dirty="0">
-                <a:latin typeface="Courier New" panose="02070309020205020404" pitchFamily="49" charset="0"/>
-                <a:ea typeface="Verdana" panose="020B0604030504040204" pitchFamily="34" charset="0"/>
-                <a:cs typeface="Courier New" panose="02070309020205020404" pitchFamily="49" charset="0"/>
-              </a:rPr>
-              <a:t>(filename, permission, dev); </a:t>
-            </a:r>
-            <a:r>
-              <a:rPr lang="en-GB" sz="500" kern="100" spc="-43" dirty="0" err="1">
-                <a:latin typeface="Verdana" panose="020B0604030504040204" pitchFamily="34" charset="0"/>
-                <a:ea typeface="Verdana" panose="020B0604030504040204" pitchFamily="34" charset="0"/>
-              </a:rPr>
-              <a:t>mknod</a:t>
-            </a:r>
-            <a:r>
-              <a:rPr lang="en-GB" sz="500" kern="100" spc="-43" dirty="0">
-                <a:latin typeface="Verdana" panose="020B0604030504040204" pitchFamily="34" charset="0"/>
-                <a:ea typeface="Verdana" panose="020B0604030504040204" pitchFamily="34" charset="0"/>
-              </a:rPr>
-              <a:t> creates a new special file e.g. a character or block device</a:t>
-            </a:r>
-          </a:p>
-          <a:p>
-            <a:pPr rtl="0">
-              <a:spcBef>
-                <a:spcPts val="0"/>
-              </a:spcBef>
-              <a:spcAft>
-                <a:spcPts val="0"/>
-              </a:spcAft>
-            </a:pPr>
-            <a:r>
-              <a:rPr lang="en-GB" sz="500" kern="100" spc="-43" dirty="0">
-                <a:latin typeface="Verdana" panose="020B0604030504040204" pitchFamily="34" charset="0"/>
-                <a:ea typeface="Verdana" panose="020B0604030504040204" pitchFamily="34" charset="0"/>
-              </a:rPr>
-              <a:t>Processes have unique </a:t>
-            </a:r>
-            <a:r>
-              <a:rPr lang="en-GB" sz="500" kern="100" spc="-43" dirty="0" err="1">
-                <a:latin typeface="Verdana" panose="020B0604030504040204" pitchFamily="34" charset="0"/>
-                <a:ea typeface="Verdana" panose="020B0604030504040204" pitchFamily="34" charset="0"/>
-              </a:rPr>
-              <a:t>fd</a:t>
-            </a:r>
-            <a:r>
-              <a:rPr lang="en-GB" sz="500" kern="100" spc="-43" dirty="0">
-                <a:latin typeface="Verdana" panose="020B0604030504040204" pitchFamily="34" charset="0"/>
-                <a:ea typeface="Verdana" panose="020B0604030504040204" pitchFamily="34" charset="0"/>
-              </a:rPr>
-              <a:t> tables. When a process is created it has 3 </a:t>
-            </a:r>
-            <a:r>
-              <a:rPr lang="en-GB" sz="500" kern="100" spc="-43" dirty="0" err="1">
-                <a:latin typeface="Verdana" panose="020B0604030504040204" pitchFamily="34" charset="0"/>
-                <a:ea typeface="Verdana" panose="020B0604030504040204" pitchFamily="34" charset="0"/>
-              </a:rPr>
-              <a:t>fds</a:t>
-            </a:r>
-            <a:r>
-              <a:rPr lang="en-GB" sz="500" kern="100" spc="-43" dirty="0">
-                <a:latin typeface="Verdana" panose="020B0604030504040204" pitchFamily="34" charset="0"/>
-                <a:ea typeface="Verdana" panose="020B0604030504040204" pitchFamily="34" charset="0"/>
-              </a:rPr>
-              <a:t>, stdin, </a:t>
-            </a:r>
-            <a:r>
-              <a:rPr lang="en-GB" sz="500" kern="100" spc="-43" dirty="0" err="1">
-                <a:latin typeface="Verdana" panose="020B0604030504040204" pitchFamily="34" charset="0"/>
-                <a:ea typeface="Verdana" panose="020B0604030504040204" pitchFamily="34" charset="0"/>
-              </a:rPr>
-              <a:t>stdout</a:t>
-            </a:r>
-            <a:r>
-              <a:rPr lang="en-GB" sz="500" kern="100" spc="-43" dirty="0">
-                <a:latin typeface="Verdana" panose="020B0604030504040204" pitchFamily="34" charset="0"/>
-                <a:ea typeface="Verdana" panose="020B0604030504040204" pitchFamily="34" charset="0"/>
-              </a:rPr>
-              <a:t>, stderr. By default they all refer to terminal from which the program started.</a:t>
-            </a:r>
-            <a:endParaRPr lang="en-GB" sz="500" b="1" dirty="0">
-              <a:effectLst/>
+              <a:rPr lang="en-GB" sz="500" b="1" u="sng" kern="100" spc="-43" dirty="0">
+                <a:latin typeface="Verdana" panose="020B0604030504040204" pitchFamily="34" charset="0"/>
+                <a:ea typeface="Verdana" panose="020B0604030504040204" pitchFamily="34" charset="0"/>
+              </a:rPr>
+              <a:t>7.4) Buses</a:t>
+            </a:r>
+            <a:r>
+              <a:rPr lang="en-GB" sz="500" kern="100" spc="-43" dirty="0">
+                <a:latin typeface="Verdana" panose="020B0604030504040204" pitchFamily="34" charset="0"/>
+                <a:ea typeface="Verdana" panose="020B0604030504040204" pitchFamily="34" charset="0"/>
+              </a:rPr>
+              <a:t>: Bus 1: Devices connected to this have high bandwidth, low latency – same speed as RAM. Bus 2: High bandwidth, medium latency – slower than mem. GPUs, network, some block. Bus 3: Lower bandwidth devices, </a:t>
+            </a:r>
+            <a:r>
+              <a:rPr lang="en-GB" sz="500" kern="100" spc="-43" dirty="0" err="1">
+                <a:latin typeface="Verdana" panose="020B0604030504040204" pitchFamily="34" charset="0"/>
+                <a:ea typeface="Verdana" panose="020B0604030504040204" pitchFamily="34" charset="0"/>
+              </a:rPr>
+              <a:t>e.g</a:t>
+            </a:r>
+            <a:r>
+              <a:rPr lang="en-GB" sz="500" kern="100" spc="-43" dirty="0">
+                <a:latin typeface="Verdana" panose="020B0604030504040204" pitchFamily="34" charset="0"/>
+                <a:ea typeface="Verdana" panose="020B0604030504040204" pitchFamily="34" charset="0"/>
+              </a:rPr>
+              <a:t>: block</a:t>
+            </a:r>
+            <a:r>
+              <a:rPr lang="en-GB" sz="500" kern="100" spc="-43">
+                <a:latin typeface="Verdana" panose="020B0604030504040204" pitchFamily="34" charset="0"/>
+                <a:ea typeface="Verdana" panose="020B0604030504040204" pitchFamily="34" charset="0"/>
+              </a:rPr>
+              <a:t>, char.</a:t>
+            </a:r>
+            <a:endParaRPr lang="en-GB" sz="500" kern="100" spc="-43" dirty="0">
+              <a:latin typeface="Verdana" panose="020B0604030504040204" pitchFamily="34" charset="0"/>
+              <a:ea typeface="Verdana" panose="020B0604030504040204" pitchFamily="34" charset="0"/>
             </a:endParaRPr>
           </a:p>
         </p:txBody>

</xml_diff>